<commit_message>
Added fixes due to sonar violations.
</commit_message>
<xml_diff>
--- a/LoadTesting.pptx
+++ b/LoadTesting.pptx
@@ -217,7 +217,7 @@
           <a:p>
             <a:fld id="{7F7A1CCF-3A8B-40F6-A64D-2A4687177E43}" type="datetimeFigureOut">
               <a:rPr lang="de-DE" smtClean="0"/>
-              <a:t>05.05.2018</a:t>
+              <a:t>09.05.2018</a:t>
             </a:fld>
             <a:endParaRPr lang="de-DE"/>
           </a:p>
@@ -710,7 +710,7 @@
           <a:p>
             <a:fld id="{29B91BC4-5E82-49A6-88C1-D8535ED7D15D}" type="datetime1">
               <a:rPr lang="de-DE" smtClean="0"/>
-              <a:t>05.05.2018</a:t>
+              <a:t>09.05.2018</a:t>
             </a:fld>
             <a:endParaRPr lang="de-DE"/>
           </a:p>
@@ -918,7 +918,7 @@
           <a:p>
             <a:fld id="{32A52664-B2C7-4A1E-B89B-81D348E24B51}" type="datetime1">
               <a:rPr lang="de-DE" smtClean="0"/>
-              <a:t>05.05.2018</a:t>
+              <a:t>09.05.2018</a:t>
             </a:fld>
             <a:endParaRPr lang="de-DE"/>
           </a:p>
@@ -1174,7 +1174,7 @@
           <a:p>
             <a:fld id="{87A80DC5-21AA-41FB-A73E-ED981639E9E3}" type="datetime1">
               <a:rPr lang="de-DE" smtClean="0"/>
-              <a:t>05.05.2018</a:t>
+              <a:t>09.05.2018</a:t>
             </a:fld>
             <a:endParaRPr lang="de-DE"/>
           </a:p>
@@ -1344,7 +1344,7 @@
           <a:p>
             <a:fld id="{BBFFFFB7-B427-4FC9-89B5-E815E530C709}" type="datetime1">
               <a:rPr lang="de-DE" smtClean="0"/>
-              <a:t>05.05.2018</a:t>
+              <a:t>09.05.2018</a:t>
             </a:fld>
             <a:endParaRPr lang="de-DE"/>
           </a:p>
@@ -1687,7 +1687,7 @@
           <a:p>
             <a:fld id="{9B4A11A6-692F-4D3F-A6E0-135304D8649E}" type="datetime1">
               <a:rPr lang="de-DE" smtClean="0"/>
-              <a:t>05.05.2018</a:t>
+              <a:t>09.05.2018</a:t>
             </a:fld>
             <a:endParaRPr lang="de-DE"/>
           </a:p>
@@ -1962,7 +1962,7 @@
           <a:p>
             <a:fld id="{2FF197E6-8FE2-43C3-B517-8EF10A23BA5B}" type="datetime1">
               <a:rPr lang="de-DE" smtClean="0"/>
-              <a:t>05.05.2018</a:t>
+              <a:t>09.05.2018</a:t>
             </a:fld>
             <a:endParaRPr lang="de-DE"/>
           </a:p>
@@ -2341,7 +2341,7 @@
           <a:p>
             <a:fld id="{88AD5C22-0615-445E-B37E-053106C142C7}" type="datetime1">
               <a:rPr lang="de-DE" smtClean="0"/>
-              <a:t>05.05.2018</a:t>
+              <a:t>09.05.2018</a:t>
             </a:fld>
             <a:endParaRPr lang="de-DE"/>
           </a:p>
@@ -2459,7 +2459,7 @@
           <a:p>
             <a:fld id="{393C4718-61D0-4C05-A837-0FF64CDC070F}" type="datetime1">
               <a:rPr lang="de-DE" smtClean="0"/>
-              <a:t>05.05.2018</a:t>
+              <a:t>09.05.2018</a:t>
             </a:fld>
             <a:endParaRPr lang="de-DE"/>
           </a:p>
@@ -2630,7 +2630,7 @@
           <a:p>
             <a:fld id="{E4C68F9C-9493-41F8-A598-7BDB27153DE0}" type="datetime1">
               <a:rPr lang="de-DE" smtClean="0"/>
-              <a:t>05.05.2018</a:t>
+              <a:t>09.05.2018</a:t>
             </a:fld>
             <a:endParaRPr lang="de-DE"/>
           </a:p>
@@ -2984,7 +2984,7 @@
           <a:p>
             <a:fld id="{25B47950-BAF5-4EB0-B7D8-7E5D445A5AF9}" type="datetime1">
               <a:rPr lang="de-DE" smtClean="0"/>
-              <a:t>05.05.2018</a:t>
+              <a:t>09.05.2018</a:t>
             </a:fld>
             <a:endParaRPr lang="de-DE"/>
           </a:p>
@@ -3361,7 +3361,7 @@
           <a:p>
             <a:fld id="{5E3FA0F3-663C-4E4D-A9AD-FCEECA59737D}" type="datetime1">
               <a:rPr lang="de-DE" smtClean="0"/>
-              <a:t>05.05.2018</a:t>
+              <a:t>09.05.2018</a:t>
             </a:fld>
             <a:endParaRPr lang="de-DE"/>
           </a:p>
@@ -3648,7 +3648,7 @@
           <a:p>
             <a:fld id="{7E243A8A-9070-4D02-9F6C-FDBBE4C2268D}" type="datetime1">
               <a:rPr lang="de-DE" smtClean="0"/>
-              <a:t>05.05.2018</a:t>
+              <a:t>09.05.2018</a:t>
             </a:fld>
             <a:endParaRPr lang="de-DE"/>
           </a:p>
@@ -4396,7 +4396,7 @@
           <a:p>
             <a:fld id="{BBFFFFB7-B427-4FC9-89B5-E815E530C709}" type="datetime1">
               <a:rPr lang="de-DE" smtClean="0"/>
-              <a:t>05.05.2018</a:t>
+              <a:t>09.05.2018</a:t>
             </a:fld>
             <a:endParaRPr lang="de-DE"/>
           </a:p>
@@ -4537,7 +4537,7 @@
           <a:p>
             <a:fld id="{BBFFFFB7-B427-4FC9-89B5-E815E530C709}" type="datetime1">
               <a:rPr lang="de-DE" smtClean="0"/>
-              <a:t>05.05.2018</a:t>
+              <a:t>09.05.2018</a:t>
             </a:fld>
             <a:endParaRPr lang="de-DE"/>
           </a:p>
@@ -4708,7 +4708,7 @@
           <a:p>
             <a:fld id="{BBFFFFB7-B427-4FC9-89B5-E815E530C709}" type="datetime1">
               <a:rPr lang="de-DE" smtClean="0"/>
-              <a:t>05.05.2018</a:t>
+              <a:t>09.05.2018</a:t>
             </a:fld>
             <a:endParaRPr lang="de-DE"/>
           </a:p>
@@ -6044,7 +6044,7 @@
           <a:p>
             <a:fld id="{5E3FA0F3-663C-4E4D-A9AD-FCEECA59737D}" type="datetime1">
               <a:rPr lang="de-DE" smtClean="0"/>
-              <a:t>05.05.2018</a:t>
+              <a:t>09.05.2018</a:t>
             </a:fld>
             <a:endParaRPr lang="de-DE"/>
           </a:p>
@@ -6176,7 +6176,7 @@
           <a:p>
             <a:fld id="{BBFFFFB7-B427-4FC9-89B5-E815E530C709}" type="datetime1">
               <a:rPr lang="de-DE" smtClean="0"/>
-              <a:t>05.05.2018</a:t>
+              <a:t>09.05.2018</a:t>
             </a:fld>
             <a:endParaRPr lang="de-DE"/>
           </a:p>
@@ -7539,7 +7539,7 @@
           <a:p>
             <a:fld id="{BBFFFFB7-B427-4FC9-89B5-E815E530C709}" type="datetime1">
               <a:rPr lang="de-DE" smtClean="0"/>
-              <a:t>05.05.2018</a:t>
+              <a:t>09.05.2018</a:t>
             </a:fld>
             <a:endParaRPr lang="de-DE"/>
           </a:p>
@@ -7576,15 +7576,15 @@
       </p:sp>
       <p:pic>
         <p:nvPicPr>
-          <p:cNvPr id="1026" name="Picture 2" descr="blur, close-up, code">
+          <p:cNvPr id="9" name="Bildplatzhalter 8">
             <a:extLst>
               <a:ext uri="{FF2B5EF4-FFF2-40B4-BE49-F238E27FC236}">
-                <a16:creationId xmlns:a16="http://schemas.microsoft.com/office/drawing/2014/main" id="{8DF9F86F-AC00-4DED-9944-975D8A97B0F6}"/>
+                <a16:creationId xmlns:a16="http://schemas.microsoft.com/office/drawing/2014/main" id="{F737AE18-3A4A-4E5D-B1D7-6A5C7FB15CFC}"/>
               </a:ext>
             </a:extLst>
           </p:cNvPr>
           <p:cNvPicPr>
-            <a:picLocks noGrp="1" noChangeAspect="1" noChangeArrowheads="1"/>
+            <a:picLocks noGrp="1" noChangeAspect="1"/>
           </p:cNvPicPr>
           <p:nvPr>
             <p:ph type="pic" idx="1"/>
@@ -7598,25 +7598,16 @@
               </a:ext>
             </a:extLst>
           </a:blip>
-          <a:srcRect t="19636" b="19636"/>
+          <a:srcRect t="19652" b="19652"/>
           <a:stretch>
             <a:fillRect/>
           </a:stretch>
         </p:blipFill>
-        <p:spPr bwMode="auto">
-          <a:prstGeom prst="rect">
-            <a:avLst/>
-          </a:prstGeom>
-          <a:noFill/>
-          <a:extLst>
-            <a:ext uri="{909E8E84-426E-40DD-AFC4-6F175D3DCCD1}">
-              <a14:hiddenFill xmlns:a14="http://schemas.microsoft.com/office/drawing/2010/main">
-                <a:solidFill>
-                  <a:srgbClr val="FFFFFF"/>
-                </a:solidFill>
-              </a14:hiddenFill>
-            </a:ext>
-          </a:extLst>
+        <p:spPr>
+          <a:xfrm>
+            <a:off x="0" y="0"/>
+            <a:ext cx="12192000" cy="4914900"/>
+          </a:xfrm>
         </p:spPr>
       </p:pic>
     </p:spTree>
@@ -7717,7 +7708,23 @@
             </a:r>
             <a:r>
               <a:rPr lang="de-DE" dirty="0"/>
-              <a:t> (Datenbank, Service)</a:t>
+              <a:t> (</a:t>
+            </a:r>
+            <a:r>
+              <a:rPr lang="de-DE" dirty="0" err="1"/>
+              <a:t>Postgres</a:t>
+            </a:r>
+            <a:r>
+              <a:rPr lang="de-DE" dirty="0"/>
+              <a:t>-Datenbank, </a:t>
+            </a:r>
+            <a:r>
+              <a:rPr lang="de-DE" dirty="0" err="1"/>
+              <a:t>WebService</a:t>
+            </a:r>
+            <a:r>
+              <a:rPr lang="de-DE" dirty="0"/>
+              <a:t>)</a:t>
             </a:r>
           </a:p>
           <a:p>
@@ -7727,7 +7734,33 @@
             </a:pPr>
             <a:r>
               <a:rPr lang="de-DE" dirty="0"/>
-              <a:t> Lasttest-Implementierungen in den jeweiligen Technologien</a:t>
+              <a:t> Lasttest-Implementierungen in den jeweiligen Technologien als </a:t>
+            </a:r>
+            <a:r>
+              <a:rPr lang="de-DE" dirty="0" err="1"/>
+              <a:t>IntelliJ</a:t>
+            </a:r>
+            <a:r>
+              <a:rPr lang="de-DE" dirty="0"/>
+              <a:t>-Projekt</a:t>
+            </a:r>
+          </a:p>
+          <a:p>
+            <a:pPr>
+              <a:buFont typeface="Arial" panose="020B0604020202020204" pitchFamily="34" charset="0"/>
+              <a:buChar char="•"/>
+            </a:pPr>
+            <a:r>
+              <a:rPr lang="de-DE" dirty="0"/>
+              <a:t> Auf Codequalität geachtet beim </a:t>
+            </a:r>
+            <a:r>
+              <a:rPr lang="de-DE" dirty="0" err="1"/>
+              <a:t>WebService</a:t>
+            </a:r>
+            <a:r>
+              <a:rPr lang="de-DE" dirty="0"/>
+              <a:t> (siehe Sonar)</a:t>
             </a:r>
           </a:p>
         </p:txBody>
@@ -7755,7 +7788,7 @@
           <a:p>
             <a:fld id="{5E3FA0F3-663C-4E4D-A9AD-FCEECA59737D}" type="datetime1">
               <a:rPr lang="de-DE" smtClean="0"/>
-              <a:t>05.05.2018</a:t>
+              <a:t>09.05.2018</a:t>
             </a:fld>
             <a:endParaRPr lang="de-DE"/>
           </a:p>
@@ -7934,7 +7967,7 @@
           <a:p>
             <a:fld id="{928650A1-1A79-48B9-A942-815D58127345}" type="datetime1">
               <a:rPr lang="de-DE" smtClean="0"/>
-              <a:t>05.05.2018</a:t>
+              <a:t>09.05.2018</a:t>
             </a:fld>
             <a:endParaRPr lang="de-DE"/>
           </a:p>
@@ -8080,7 +8113,7 @@
           <a:p>
             <a:fld id="{BBFFFFB7-B427-4FC9-89B5-E815E530C709}" type="datetime1">
               <a:rPr lang="de-DE" smtClean="0"/>
-              <a:t>05.05.2018</a:t>
+              <a:t>09.05.2018</a:t>
             </a:fld>
             <a:endParaRPr lang="de-DE"/>
           </a:p>
@@ -8297,7 +8330,7 @@
           <a:p>
             <a:fld id="{5E3FA0F3-663C-4E4D-A9AD-FCEECA59737D}" type="datetime1">
               <a:rPr lang="de-DE" smtClean="0"/>
-              <a:t>05.05.2018</a:t>
+              <a:t>09.05.2018</a:t>
             </a:fld>
             <a:endParaRPr lang="de-DE"/>
           </a:p>
@@ -8428,8 +8461,12 @@
               <a:buChar char="•"/>
             </a:pPr>
             <a:r>
-              <a:rPr lang="en-US" dirty="0"/>
-              <a:t>Measure speed, scalability, and/or stability characteristics of the product under test. </a:t>
+              <a:rPr lang="de-DE" dirty="0"/>
+              <a:t>Messen von Geschwindigkeit, Stabilität und Skalierbarkeit </a:t>
+            </a:r>
+            <a:r>
+              <a:rPr lang="de-DE"/>
+              <a:t>eines Systems</a:t>
             </a:r>
             <a:endParaRPr lang="de-DE" dirty="0"/>
           </a:p>
@@ -8550,7 +8587,7 @@
           <a:p>
             <a:fld id="{5E3FA0F3-663C-4E4D-A9AD-FCEECA59737D}" type="datetime1">
               <a:rPr lang="de-DE" smtClean="0"/>
-              <a:t>05.05.2018</a:t>
+              <a:t>09.05.2018</a:t>
             </a:fld>
             <a:endParaRPr lang="de-DE"/>
           </a:p>
@@ -8691,7 +8728,7 @@
           <a:p>
             <a:fld id="{BBFFFFB7-B427-4FC9-89B5-E815E530C709}" type="datetime1">
               <a:rPr lang="de-DE" smtClean="0"/>
-              <a:t>05.05.2018</a:t>
+              <a:t>09.05.2018</a:t>
             </a:fld>
             <a:endParaRPr lang="de-DE"/>
           </a:p>
@@ -8893,7 +8930,7 @@
           <a:p>
             <a:fld id="{40945502-2D6D-4EF3-B5E9-AD6E136212A6}" type="datetime1">
               <a:rPr lang="de-DE" smtClean="0"/>
-              <a:t>05.05.2018</a:t>
+              <a:t>09.05.2018</a:t>
             </a:fld>
             <a:endParaRPr lang="de-DE"/>
           </a:p>
@@ -9106,7 +9143,7 @@
             </a:pPr>
             <a:r>
               <a:rPr lang="de-DE" dirty="0"/>
-              <a:t> MIT License</a:t>
+              <a:t> MIT Lizenz</a:t>
             </a:r>
           </a:p>
           <a:p>
@@ -9144,7 +9181,7 @@
           <a:p>
             <a:fld id="{BBFFFFB7-B427-4FC9-89B5-E815E530C709}" type="datetime1">
               <a:rPr lang="de-DE" smtClean="0"/>
-              <a:t>05.05.2018</a:t>
+              <a:t>09.05.2018</a:t>
             </a:fld>
             <a:endParaRPr lang="de-DE"/>
           </a:p>
@@ -9362,7 +9399,7 @@
           <a:p>
             <a:fld id="{BBFFFFB7-B427-4FC9-89B5-E815E530C709}" type="datetime1">
               <a:rPr lang="de-DE" smtClean="0"/>
-              <a:t>05.05.2018</a:t>
+              <a:t>09.05.2018</a:t>
             </a:fld>
             <a:endParaRPr lang="de-DE"/>
           </a:p>
@@ -9478,7 +9515,7 @@
           <a:p>
             <a:fld id="{BBFFFFB7-B427-4FC9-89B5-E815E530C709}" type="datetime1">
               <a:rPr lang="de-DE" smtClean="0"/>
-              <a:t>05.05.2018</a:t>
+              <a:t>09.05.2018</a:t>
             </a:fld>
             <a:endParaRPr lang="de-DE"/>
           </a:p>
@@ -9550,7 +9587,7 @@
             </a:pPr>
             <a:r>
               <a:rPr lang="de-DE" dirty="0"/>
-              <a:t> AGPL License</a:t>
+              <a:t> AGPL Lizenz</a:t>
             </a:r>
           </a:p>
           <a:p>
@@ -9560,7 +9597,7 @@
             </a:pPr>
             <a:r>
               <a:rPr lang="de-DE" dirty="0"/>
-              <a:t> Programmiersprache: JavaScript and GO</a:t>
+              <a:t> Programmiersprache: JavaScript und GO</a:t>
             </a:r>
           </a:p>
         </p:txBody>

</xml_diff>

<commit_message>
Finished docker-compose startup order. Project can now be started with 'docker-compose up'. Fixed some sonar violations, add comments.
</commit_message>
<xml_diff>
--- a/LoadTesting.pptx
+++ b/LoadTesting.pptx
@@ -16,8 +16,8 @@
     <p:sldId id="258" r:id="rId7"/>
     <p:sldId id="262" r:id="rId8"/>
     <p:sldId id="266" r:id="rId9"/>
-    <p:sldId id="267" r:id="rId10"/>
-    <p:sldId id="268" r:id="rId11"/>
+    <p:sldId id="274" r:id="rId10"/>
+    <p:sldId id="267" r:id="rId11"/>
     <p:sldId id="269" r:id="rId12"/>
     <p:sldId id="265" r:id="rId13"/>
     <p:sldId id="270" r:id="rId14"/>
@@ -217,7 +217,7 @@
           <a:p>
             <a:fld id="{7F7A1CCF-3A8B-40F6-A64D-2A4687177E43}" type="datetimeFigureOut">
               <a:rPr lang="de-DE" smtClean="0"/>
-              <a:t>09.05.2018</a:t>
+              <a:t>14.05.2018</a:t>
             </a:fld>
             <a:endParaRPr lang="de-DE"/>
           </a:p>
@@ -710,7 +710,7 @@
           <a:p>
             <a:fld id="{29B91BC4-5E82-49A6-88C1-D8535ED7D15D}" type="datetime1">
               <a:rPr lang="de-DE" smtClean="0"/>
-              <a:t>09.05.2018</a:t>
+              <a:t>14.05.2018</a:t>
             </a:fld>
             <a:endParaRPr lang="de-DE"/>
           </a:p>
@@ -918,7 +918,7 @@
           <a:p>
             <a:fld id="{32A52664-B2C7-4A1E-B89B-81D348E24B51}" type="datetime1">
               <a:rPr lang="de-DE" smtClean="0"/>
-              <a:t>09.05.2018</a:t>
+              <a:t>14.05.2018</a:t>
             </a:fld>
             <a:endParaRPr lang="de-DE"/>
           </a:p>
@@ -1174,7 +1174,7 @@
           <a:p>
             <a:fld id="{87A80DC5-21AA-41FB-A73E-ED981639E9E3}" type="datetime1">
               <a:rPr lang="de-DE" smtClean="0"/>
-              <a:t>09.05.2018</a:t>
+              <a:t>14.05.2018</a:t>
             </a:fld>
             <a:endParaRPr lang="de-DE"/>
           </a:p>
@@ -1344,7 +1344,7 @@
           <a:p>
             <a:fld id="{BBFFFFB7-B427-4FC9-89B5-E815E530C709}" type="datetime1">
               <a:rPr lang="de-DE" smtClean="0"/>
-              <a:t>09.05.2018</a:t>
+              <a:t>14.05.2018</a:t>
             </a:fld>
             <a:endParaRPr lang="de-DE"/>
           </a:p>
@@ -1687,7 +1687,7 @@
           <a:p>
             <a:fld id="{9B4A11A6-692F-4D3F-A6E0-135304D8649E}" type="datetime1">
               <a:rPr lang="de-DE" smtClean="0"/>
-              <a:t>09.05.2018</a:t>
+              <a:t>14.05.2018</a:t>
             </a:fld>
             <a:endParaRPr lang="de-DE"/>
           </a:p>
@@ -1962,7 +1962,7 @@
           <a:p>
             <a:fld id="{2FF197E6-8FE2-43C3-B517-8EF10A23BA5B}" type="datetime1">
               <a:rPr lang="de-DE" smtClean="0"/>
-              <a:t>09.05.2018</a:t>
+              <a:t>14.05.2018</a:t>
             </a:fld>
             <a:endParaRPr lang="de-DE"/>
           </a:p>
@@ -2341,7 +2341,7 @@
           <a:p>
             <a:fld id="{88AD5C22-0615-445E-B37E-053106C142C7}" type="datetime1">
               <a:rPr lang="de-DE" smtClean="0"/>
-              <a:t>09.05.2018</a:t>
+              <a:t>14.05.2018</a:t>
             </a:fld>
             <a:endParaRPr lang="de-DE"/>
           </a:p>
@@ -2459,7 +2459,7 @@
           <a:p>
             <a:fld id="{393C4718-61D0-4C05-A837-0FF64CDC070F}" type="datetime1">
               <a:rPr lang="de-DE" smtClean="0"/>
-              <a:t>09.05.2018</a:t>
+              <a:t>14.05.2018</a:t>
             </a:fld>
             <a:endParaRPr lang="de-DE"/>
           </a:p>
@@ -2630,7 +2630,7 @@
           <a:p>
             <a:fld id="{E4C68F9C-9493-41F8-A598-7BDB27153DE0}" type="datetime1">
               <a:rPr lang="de-DE" smtClean="0"/>
-              <a:t>09.05.2018</a:t>
+              <a:t>14.05.2018</a:t>
             </a:fld>
             <a:endParaRPr lang="de-DE"/>
           </a:p>
@@ -2984,7 +2984,7 @@
           <a:p>
             <a:fld id="{25B47950-BAF5-4EB0-B7D8-7E5D445A5AF9}" type="datetime1">
               <a:rPr lang="de-DE" smtClean="0"/>
-              <a:t>09.05.2018</a:t>
+              <a:t>14.05.2018</a:t>
             </a:fld>
             <a:endParaRPr lang="de-DE"/>
           </a:p>
@@ -3361,7 +3361,7 @@
           <a:p>
             <a:fld id="{5E3FA0F3-663C-4E4D-A9AD-FCEECA59737D}" type="datetime1">
               <a:rPr lang="de-DE" smtClean="0"/>
-              <a:t>09.05.2018</a:t>
+              <a:t>14.05.2018</a:t>
             </a:fld>
             <a:endParaRPr lang="de-DE"/>
           </a:p>
@@ -3648,7 +3648,7 @@
           <a:p>
             <a:fld id="{7E243A8A-9070-4D02-9F6C-FDBBE4C2268D}" type="datetime1">
               <a:rPr lang="de-DE" smtClean="0"/>
-              <a:t>09.05.2018</a:t>
+              <a:t>14.05.2018</a:t>
             </a:fld>
             <a:endParaRPr lang="de-DE"/>
           </a:p>
@@ -4300,7 +4300,7 @@
           <p:cNvPr id="2" name="Titel 1">
             <a:extLst>
               <a:ext uri="{FF2B5EF4-FFF2-40B4-BE49-F238E27FC236}">
-                <a16:creationId xmlns:a16="http://schemas.microsoft.com/office/drawing/2014/main" id="{AB2E0062-0DA3-4E1D-B5A1-CEE361E0E4A4}"/>
+                <a16:creationId xmlns:a16="http://schemas.microsoft.com/office/drawing/2014/main" id="{FC5E778E-2A11-4C1E-8D8C-273067E4E86A}"/>
               </a:ext>
             </a:extLst>
           </p:cNvPr>
@@ -4317,43 +4317,18 @@
           <a:lstStyle/>
           <a:p>
             <a:r>
-              <a:rPr lang="de-DE" dirty="0" err="1"/>
-              <a:t>Bees</a:t>
-            </a:r>
-            <a:r>
               <a:rPr lang="de-DE" dirty="0"/>
-              <a:t> </a:t>
-            </a:r>
-            <a:r>
-              <a:rPr lang="de-DE" dirty="0" err="1"/>
-              <a:t>with</a:t>
-            </a:r>
-            <a:r>
-              <a:rPr lang="de-DE" dirty="0"/>
-              <a:t> </a:t>
-            </a:r>
-            <a:r>
-              <a:rPr lang="de-DE" dirty="0" err="1"/>
-              <a:t>Machine</a:t>
-            </a:r>
-            <a:r>
-              <a:rPr lang="de-DE" dirty="0"/>
-              <a:t> </a:t>
-            </a:r>
-            <a:r>
-              <a:rPr lang="de-DE" dirty="0" err="1"/>
-              <a:t>Guns</a:t>
-            </a:r>
-            <a:endParaRPr lang="de-DE" dirty="0"/>
-          </a:p>
-        </p:txBody>
-      </p:sp>
-      <p:sp>
-        <p:nvSpPr>
-          <p:cNvPr id="3" name="Inhaltsplatzhalter 2">
+              <a:t>k6 </a:t>
+            </a:r>
+          </a:p>
+        </p:txBody>
+      </p:sp>
+      <p:sp>
+        <p:nvSpPr>
+          <p:cNvPr id="4" name="Datumsplatzhalter 3">
             <a:extLst>
               <a:ext uri="{FF2B5EF4-FFF2-40B4-BE49-F238E27FC236}">
-                <a16:creationId xmlns:a16="http://schemas.microsoft.com/office/drawing/2014/main" id="{C10B2F1E-6305-4B3B-B3A3-9B13F7849FF4}"/>
+                <a16:creationId xmlns:a16="http://schemas.microsoft.com/office/drawing/2014/main" id="{DD0D5017-119E-4C58-9EF9-8EA436CBC7DC}"/>
               </a:ext>
             </a:extLst>
           </p:cNvPr>
@@ -4361,31 +4336,6 @@
             <a:spLocks noGrp="1"/>
           </p:cNvSpPr>
           <p:nvPr>
-            <p:ph idx="1"/>
-          </p:nvPr>
-        </p:nvSpPr>
-        <p:spPr/>
-        <p:txBody>
-          <a:bodyPr/>
-          <a:lstStyle/>
-          <a:p>
-            <a:endParaRPr lang="de-DE"/>
-          </a:p>
-        </p:txBody>
-      </p:sp>
-      <p:sp>
-        <p:nvSpPr>
-          <p:cNvPr id="4" name="Datumsplatzhalter 3">
-            <a:extLst>
-              <a:ext uri="{FF2B5EF4-FFF2-40B4-BE49-F238E27FC236}">
-                <a16:creationId xmlns:a16="http://schemas.microsoft.com/office/drawing/2014/main" id="{A08B5C12-B2D6-413A-B911-DC632E98AAE0}"/>
-              </a:ext>
-            </a:extLst>
-          </p:cNvPr>
-          <p:cNvSpPr>
-            <a:spLocks noGrp="1"/>
-          </p:cNvSpPr>
-          <p:nvPr>
             <p:ph type="dt" sz="half" idx="10"/>
           </p:nvPr>
         </p:nvSpPr>
@@ -4396,7 +4346,7 @@
           <a:p>
             <a:fld id="{BBFFFFB7-B427-4FC9-89B5-E815E530C709}" type="datetime1">
               <a:rPr lang="de-DE" smtClean="0"/>
-              <a:t>09.05.2018</a:t>
+              <a:t>14.05.2018</a:t>
             </a:fld>
             <a:endParaRPr lang="de-DE"/>
           </a:p>
@@ -4407,7 +4357,7 @@
           <p:cNvPr id="5" name="Foliennummernplatzhalter 4">
             <a:extLst>
               <a:ext uri="{FF2B5EF4-FFF2-40B4-BE49-F238E27FC236}">
-                <a16:creationId xmlns:a16="http://schemas.microsoft.com/office/drawing/2014/main" id="{6779CDC4-BD2F-4C3C-88C2-A183F6FE1F37}"/>
+                <a16:creationId xmlns:a16="http://schemas.microsoft.com/office/drawing/2014/main" id="{942EAD44-7938-41E8-BB37-7A5A16FC2BD2}"/>
               </a:ext>
             </a:extLst>
           </p:cNvPr>
@@ -4431,10 +4381,92 @@
           </a:p>
         </p:txBody>
       </p:sp>
+      <p:sp>
+        <p:nvSpPr>
+          <p:cNvPr id="9" name="Inhaltsplatzhalter 8">
+            <a:extLst>
+              <a:ext uri="{FF2B5EF4-FFF2-40B4-BE49-F238E27FC236}">
+                <a16:creationId xmlns:a16="http://schemas.microsoft.com/office/drawing/2014/main" id="{856C14B4-A813-4D9C-8839-6D7097D8FA29}"/>
+              </a:ext>
+            </a:extLst>
+          </p:cNvPr>
+          <p:cNvSpPr>
+            <a:spLocks noGrp="1"/>
+          </p:cNvSpPr>
+          <p:nvPr>
+            <p:ph idx="1"/>
+          </p:nvPr>
+        </p:nvSpPr>
+        <p:spPr/>
+        <p:txBody>
+          <a:bodyPr/>
+          <a:lstStyle/>
+          <a:p>
+            <a:pPr>
+              <a:buFont typeface="Arial" panose="020B0604020202020204" pitchFamily="34" charset="0"/>
+              <a:buChar char="•"/>
+            </a:pPr>
+            <a:r>
+              <a:rPr lang="de-DE" dirty="0"/>
+              <a:t> 2016 veröffentlicht (aktuell in Version 0.20.0)</a:t>
+            </a:r>
+          </a:p>
+          <a:p>
+            <a:pPr>
+              <a:buFont typeface="Arial" panose="020B0604020202020204" pitchFamily="34" charset="0"/>
+              <a:buChar char="•"/>
+            </a:pPr>
+            <a:r>
+              <a:rPr lang="de-DE" dirty="0"/>
+              <a:t> AGPL Lizenz</a:t>
+            </a:r>
+          </a:p>
+          <a:p>
+            <a:pPr>
+              <a:buFont typeface="Arial" panose="020B0604020202020204" pitchFamily="34" charset="0"/>
+              <a:buChar char="•"/>
+            </a:pPr>
+            <a:r>
+              <a:rPr lang="de-DE" dirty="0"/>
+              <a:t> Programmiersprache: JavaScript und GO</a:t>
+            </a:r>
+          </a:p>
+        </p:txBody>
+      </p:sp>
+      <p:pic>
+        <p:nvPicPr>
+          <p:cNvPr id="3" name="Grafik 2">
+            <a:extLst>
+              <a:ext uri="{FF2B5EF4-FFF2-40B4-BE49-F238E27FC236}">
+                <a16:creationId xmlns:a16="http://schemas.microsoft.com/office/drawing/2014/main" id="{6F55CB92-7381-458D-9959-7EFD9B012DBA}"/>
+              </a:ext>
+            </a:extLst>
+          </p:cNvPr>
+          <p:cNvPicPr>
+            <a:picLocks noChangeAspect="1"/>
+          </p:cNvPicPr>
+          <p:nvPr/>
+        </p:nvPicPr>
+        <p:blipFill>
+          <a:blip r:embed="rId2"/>
+          <a:stretch>
+            <a:fillRect/>
+          </a:stretch>
+        </p:blipFill>
+        <p:spPr>
+          <a:xfrm>
+            <a:off x="1097280" y="3397718"/>
+            <a:ext cx="10058400" cy="2471376"/>
+          </a:xfrm>
+          <a:prstGeom prst="rect">
+            <a:avLst/>
+          </a:prstGeom>
+        </p:spPr>
+      </p:pic>
     </p:spTree>
     <p:extLst>
       <p:ext uri="{BB962C8B-B14F-4D97-AF65-F5344CB8AC3E}">
-        <p14:creationId xmlns:p14="http://schemas.microsoft.com/office/powerpoint/2010/main" val="335859703"/>
+        <p14:creationId xmlns:p14="http://schemas.microsoft.com/office/powerpoint/2010/main" val="2213988132"/>
       </p:ext>
     </p:extLst>
   </p:cSld>
@@ -4537,7 +4569,7 @@
           <a:p>
             <a:fld id="{BBFFFFB7-B427-4FC9-89B5-E815E530C709}" type="datetime1">
               <a:rPr lang="de-DE" smtClean="0"/>
-              <a:t>09.05.2018</a:t>
+              <a:t>14.05.2018</a:t>
             </a:fld>
             <a:endParaRPr lang="de-DE"/>
           </a:p>
@@ -4708,7 +4740,7 @@
           <a:p>
             <a:fld id="{BBFFFFB7-B427-4FC9-89B5-E815E530C709}" type="datetime1">
               <a:rPr lang="de-DE" smtClean="0"/>
-              <a:t>09.05.2018</a:t>
+              <a:t>14.05.2018</a:t>
             </a:fld>
             <a:endParaRPr lang="de-DE"/>
           </a:p>
@@ -4860,14 +4892,14 @@
             <p:ph idx="1"/>
             <p:extLst>
               <p:ext uri="{D42A27DB-BD31-4B8C-83A1-F6EECF244321}">
-                <p14:modId xmlns:p14="http://schemas.microsoft.com/office/powerpoint/2010/main" val="2425337103"/>
+                <p14:modId xmlns:p14="http://schemas.microsoft.com/office/powerpoint/2010/main" val="2210680487"/>
               </p:ext>
             </p:extLst>
           </p:nvPr>
         </p:nvGraphicFramePr>
         <p:xfrm>
-          <a:off x="175801" y="1863041"/>
-          <a:ext cx="11901358" cy="3708400"/>
+          <a:off x="437326" y="1836408"/>
+          <a:ext cx="11273724" cy="3606800"/>
         </p:xfrm>
         <a:graphic>
           <a:graphicData uri="http://schemas.openxmlformats.org/drawingml/2006/table">
@@ -4876,7 +4908,7 @@
                 <a:tableStyleId>{5C22544A-7EE6-4342-B048-85BDC9FD1C3A}</a:tableStyleId>
               </a:tblPr>
               <a:tblGrid>
-                <a:gridCol w="2372424">
+                <a:gridCol w="1684274">
                   <a:extLst>
                     <a:ext uri="{9D8B030D-6E8A-4147-A177-3AD203B41FA5}">
                       <a16:colId xmlns:a16="http://schemas.microsoft.com/office/drawing/2014/main" val="2740601797"/>
@@ -4890,7 +4922,7 @@
                     </a:ext>
                   </a:extLst>
                 </a:gridCol>
-                <a:gridCol w="1374902">
+                <a:gridCol w="1270318">
                   <a:extLst>
                     <a:ext uri="{9D8B030D-6E8A-4147-A177-3AD203B41FA5}">
                       <a16:colId xmlns:a16="http://schemas.microsoft.com/office/drawing/2014/main" val="851099838"/>
@@ -4904,21 +4936,21 @@
                     </a:ext>
                   </a:extLst>
                 </a:gridCol>
-                <a:gridCol w="1374902">
+                <a:gridCol w="1229451">
                   <a:extLst>
                     <a:ext uri="{9D8B030D-6E8A-4147-A177-3AD203B41FA5}">
                       <a16:colId xmlns:a16="http://schemas.microsoft.com/office/drawing/2014/main" val="3251378671"/>
                     </a:ext>
                   </a:extLst>
                 </a:gridCol>
-                <a:gridCol w="813118">
+                <a:gridCol w="958569">
                   <a:extLst>
                     <a:ext uri="{9D8B030D-6E8A-4147-A177-3AD203B41FA5}">
                       <a16:colId xmlns:a16="http://schemas.microsoft.com/office/drawing/2014/main" val="1017323343"/>
                     </a:ext>
                   </a:extLst>
                 </a:gridCol>
-                <a:gridCol w="1105218">
+                <a:gridCol w="1270318">
                   <a:extLst>
                     <a:ext uri="{9D8B030D-6E8A-4147-A177-3AD203B41FA5}">
                       <a16:colId xmlns:a16="http://schemas.microsoft.com/office/drawing/2014/main" val="754126515"/>
@@ -5020,15 +5052,7 @@
                     <a:p>
                       <a:r>
                         <a:rPr lang="de-DE" dirty="0" err="1"/>
-                        <a:t>Bees</a:t>
-                      </a:r>
-                      <a:r>
-                        <a:rPr lang="de-DE" dirty="0"/>
-                        <a:t> </a:t>
-                      </a:r>
-                      <a:r>
-                        <a:rPr lang="de-DE" dirty="0" err="1"/>
-                        <a:t>wM</a:t>
+                        <a:t>nGrinder</a:t>
                       </a:r>
                       <a:endParaRPr lang="de-DE" dirty="0"/>
                     </a:p>
@@ -5156,7 +5180,7 @@
                     <a:p>
                       <a:r>
                         <a:rPr lang="de-DE" dirty="0"/>
-                        <a:t>MIT</a:t>
+                        <a:t>Apache 2.0</a:t>
                       </a:r>
                     </a:p>
                   </a:txBody>
@@ -5284,13 +5308,13 @@
                     <a:p>
                       <a:r>
                         <a:rPr lang="de-DE" dirty="0"/>
-                        <a:t>0.1.4</a:t>
+                        <a:t>3.4.1</a:t>
                       </a:r>
                     </a:p>
                   </a:txBody>
                   <a:tcPr>
                     <a:solidFill>
-                      <a:srgbClr val="FF0000"/>
+                      <a:srgbClr val="92D050"/>
                     </a:solidFill>
                   </a:tcPr>
                 </a:tc>
@@ -5409,7 +5433,7 @@
                     <a:p>
                       <a:r>
                         <a:rPr lang="de-DE" dirty="0"/>
-                        <a:t>2013</a:t>
+                        <a:t>2012</a:t>
                       </a:r>
                     </a:p>
                   </a:txBody>
@@ -5523,30 +5547,51 @@
                     <a:bodyPr/>
                     <a:lstStyle/>
                     <a:p>
-                      <a:endParaRPr lang="de-DE" dirty="0"/>
-                    </a:p>
-                  </a:txBody>
-                  <a:tcPr/>
-                </a:tc>
-                <a:tc>
-                  <a:txBody>
-                    <a:bodyPr/>
-                    <a:lstStyle/>
-                    <a:p>
-                      <a:endParaRPr lang="de-DE"/>
-                    </a:p>
-                  </a:txBody>
-                  <a:tcPr/>
-                </a:tc>
-                <a:tc>
-                  <a:txBody>
-                    <a:bodyPr/>
-                    <a:lstStyle/>
-                    <a:p>
-                      <a:endParaRPr lang="de-DE"/>
-                    </a:p>
-                  </a:txBody>
-                  <a:tcPr/>
+                      <a:r>
+                        <a:rPr lang="de-DE" dirty="0"/>
+                        <a:t>GitHub</a:t>
+                      </a:r>
+                    </a:p>
+                  </a:txBody>
+                  <a:tcPr>
+                    <a:solidFill>
+                      <a:srgbClr val="92D050"/>
+                    </a:solidFill>
+                  </a:tcPr>
+                </a:tc>
+                <a:tc>
+                  <a:txBody>
+                    <a:bodyPr/>
+                    <a:lstStyle/>
+                    <a:p>
+                      <a:r>
+                        <a:rPr lang="de-DE" dirty="0"/>
+                        <a:t>GitHub</a:t>
+                      </a:r>
+                    </a:p>
+                  </a:txBody>
+                  <a:tcPr>
+                    <a:solidFill>
+                      <a:srgbClr val="92D050"/>
+                    </a:solidFill>
+                  </a:tcPr>
+                </a:tc>
+                <a:tc>
+                  <a:txBody>
+                    <a:bodyPr/>
+                    <a:lstStyle/>
+                    <a:p>
+                      <a:r>
+                        <a:rPr lang="de-DE" dirty="0"/>
+                        <a:t>Google Groups</a:t>
+                      </a:r>
+                    </a:p>
+                  </a:txBody>
+                  <a:tcPr>
+                    <a:solidFill>
+                      <a:srgbClr val="92D050"/>
+                    </a:solidFill>
+                  </a:tcPr>
                 </a:tc>
                 <a:extLst>
                   <a:ext uri="{0D108BD9-81ED-4DB2-BD59-A6C34878D82A}">
@@ -5641,112 +5686,6 @@
                 <a:extLst>
                   <a:ext uri="{0D108BD9-81ED-4DB2-BD59-A6C34878D82A}">
                     <a16:rowId xmlns:a16="http://schemas.microsoft.com/office/drawing/2014/main" val="468078094"/>
-                  </a:ext>
-                </a:extLst>
-              </a:tr>
-              <a:tr h="370840">
-                <a:tc>
-                  <a:txBody>
-                    <a:bodyPr/>
-                    <a:lstStyle/>
-                    <a:p>
-                      <a:r>
-                        <a:rPr lang="de-DE" dirty="0"/>
-                        <a:t>Maven/</a:t>
-                      </a:r>
-                      <a:r>
-                        <a:rPr lang="de-DE" dirty="0" err="1"/>
-                        <a:t>Gradle</a:t>
-                      </a:r>
-                      <a:r>
-                        <a:rPr lang="de-DE" dirty="0"/>
-                        <a:t> Support</a:t>
-                      </a:r>
-                    </a:p>
-                  </a:txBody>
-                  <a:tcPr/>
-                </a:tc>
-                <a:tc>
-                  <a:txBody>
-                    <a:bodyPr/>
-                    <a:lstStyle/>
-                    <a:p>
-                      <a:r>
-                        <a:rPr lang="de-DE" dirty="0"/>
-                        <a:t>Maven/</a:t>
-                      </a:r>
-                      <a:r>
-                        <a:rPr lang="de-DE" dirty="0" err="1"/>
-                        <a:t>Gradle</a:t>
-                      </a:r>
-                      <a:endParaRPr lang="de-DE" dirty="0"/>
-                    </a:p>
-                  </a:txBody>
-                  <a:tcPr/>
-                </a:tc>
-                <a:tc>
-                  <a:txBody>
-                    <a:bodyPr/>
-                    <a:lstStyle/>
-                    <a:p>
-                      <a:endParaRPr lang="de-DE" dirty="0"/>
-                    </a:p>
-                  </a:txBody>
-                  <a:tcPr/>
-                </a:tc>
-                <a:tc>
-                  <a:txBody>
-                    <a:bodyPr/>
-                    <a:lstStyle/>
-                    <a:p>
-                      <a:endParaRPr lang="de-DE" dirty="0"/>
-                    </a:p>
-                  </a:txBody>
-                  <a:tcPr/>
-                </a:tc>
-                <a:tc>
-                  <a:txBody>
-                    <a:bodyPr/>
-                    <a:lstStyle/>
-                    <a:p>
-                      <a:endParaRPr lang="de-DE" dirty="0"/>
-                    </a:p>
-                  </a:txBody>
-                  <a:tcPr/>
-                </a:tc>
-                <a:tc>
-                  <a:txBody>
-                    <a:bodyPr/>
-                    <a:lstStyle/>
-                    <a:p>
-                      <a:endParaRPr lang="de-DE" dirty="0"/>
-                    </a:p>
-                  </a:txBody>
-                  <a:tcPr/>
-                </a:tc>
-                <a:tc>
-                  <a:txBody>
-                    <a:bodyPr/>
-                    <a:lstStyle/>
-                    <a:p>
-                      <a:endParaRPr lang="de-DE" dirty="0"/>
-                    </a:p>
-                  </a:txBody>
-                  <a:tcPr/>
-                </a:tc>
-                <a:tc>
-                  <a:txBody>
-                    <a:bodyPr/>
-                    <a:lstStyle/>
-                    <a:p>
-                      <a:endParaRPr lang="de-DE" dirty="0"/>
-                    </a:p>
-                  </a:txBody>
-                  <a:tcPr/>
-                </a:tc>
-                <a:extLst>
-                  <a:ext uri="{0D108BD9-81ED-4DB2-BD59-A6C34878D82A}">
-                    <a16:rowId xmlns:a16="http://schemas.microsoft.com/office/drawing/2014/main" val="2394767327"/>
                   </a:ext>
                 </a:extLst>
               </a:tr>
@@ -6044,7 +5983,7 @@
           <a:p>
             <a:fld id="{5E3FA0F3-663C-4E4D-A9AD-FCEECA59737D}" type="datetime1">
               <a:rPr lang="de-DE" smtClean="0"/>
-              <a:t>09.05.2018</a:t>
+              <a:t>14.05.2018</a:t>
             </a:fld>
             <a:endParaRPr lang="de-DE"/>
           </a:p>
@@ -6124,7 +6063,7 @@
           <a:bodyPr/>
           <a:lstStyle/>
           <a:p>
-            <a:endParaRPr lang="de-DE"/>
+            <a:endParaRPr lang="de-DE" dirty="0"/>
           </a:p>
         </p:txBody>
       </p:sp>
@@ -6149,7 +6088,7 @@
           <a:bodyPr/>
           <a:lstStyle/>
           <a:p>
-            <a:endParaRPr lang="de-DE"/>
+            <a:endParaRPr lang="de-DE" dirty="0"/>
           </a:p>
         </p:txBody>
       </p:sp>
@@ -6176,7 +6115,7 @@
           <a:p>
             <a:fld id="{BBFFFFB7-B427-4FC9-89B5-E815E530C709}" type="datetime1">
               <a:rPr lang="de-DE" smtClean="0"/>
-              <a:t>09.05.2018</a:t>
+              <a:t>14.05.2018</a:t>
             </a:fld>
             <a:endParaRPr lang="de-DE"/>
           </a:p>
@@ -6226,14 +6165,14 @@
           <p:nvPr>
             <p:extLst>
               <p:ext uri="{D42A27DB-BD31-4B8C-83A1-F6EECF244321}">
-                <p14:modId xmlns:p14="http://schemas.microsoft.com/office/powerpoint/2010/main" val="1705911498"/>
+                <p14:modId xmlns:p14="http://schemas.microsoft.com/office/powerpoint/2010/main" val="3152685586"/>
               </p:ext>
             </p:extLst>
           </p:nvPr>
         </p:nvGraphicFramePr>
         <p:xfrm>
-          <a:off x="175801" y="713749"/>
-          <a:ext cx="12294654" cy="4246880"/>
+          <a:off x="301780" y="941033"/>
+          <a:ext cx="11649399" cy="3879269"/>
         </p:xfrm>
         <a:graphic>
           <a:graphicData uri="http://schemas.openxmlformats.org/drawingml/2006/table">
@@ -6242,56 +6181,56 @@
                 <a:tableStyleId>{5C22544A-7EE6-4342-B048-85BDC9FD1C3A}</a:tableStyleId>
               </a:tblPr>
               <a:tblGrid>
-                <a:gridCol w="1812390">
+                <a:gridCol w="1895399">
                   <a:extLst>
                     <a:ext uri="{9D8B030D-6E8A-4147-A177-3AD203B41FA5}">
                       <a16:colId xmlns:a16="http://schemas.microsoft.com/office/drawing/2014/main" val="2740601797"/>
                     </a:ext>
                   </a:extLst>
                 </a:gridCol>
-                <a:gridCol w="2457974">
+                <a:gridCol w="2570551">
                   <a:extLst>
                     <a:ext uri="{9D8B030D-6E8A-4147-A177-3AD203B41FA5}">
                       <a16:colId xmlns:a16="http://schemas.microsoft.com/office/drawing/2014/main" val="130159350"/>
                     </a:ext>
                   </a:extLst>
                 </a:gridCol>
-                <a:gridCol w="1981248">
+                <a:gridCol w="1066186">
                   <a:extLst>
                     <a:ext uri="{9D8B030D-6E8A-4147-A177-3AD203B41FA5}">
                       <a16:colId xmlns:a16="http://schemas.microsoft.com/office/drawing/2014/main" val="851099838"/>
                     </a:ext>
                   </a:extLst>
                 </a:gridCol>
-                <a:gridCol w="1374902">
+                <a:gridCol w="1066186">
                   <a:extLst>
                     <a:ext uri="{9D8B030D-6E8A-4147-A177-3AD203B41FA5}">
                       <a16:colId xmlns:a16="http://schemas.microsoft.com/office/drawing/2014/main" val="2919539333"/>
                     </a:ext>
                   </a:extLst>
                 </a:gridCol>
-                <a:gridCol w="1374902">
+                <a:gridCol w="1437873">
                   <a:extLst>
                     <a:ext uri="{9D8B030D-6E8A-4147-A177-3AD203B41FA5}">
                       <a16:colId xmlns:a16="http://schemas.microsoft.com/office/drawing/2014/main" val="3251378671"/>
                     </a:ext>
                   </a:extLst>
                 </a:gridCol>
-                <a:gridCol w="813118">
+                <a:gridCol w="1019493">
                   <a:extLst>
                     <a:ext uri="{9D8B030D-6E8A-4147-A177-3AD203B41FA5}">
                       <a16:colId xmlns:a16="http://schemas.microsoft.com/office/drawing/2014/main" val="1017323343"/>
                     </a:ext>
                   </a:extLst>
                 </a:gridCol>
-                <a:gridCol w="1105218">
+                <a:gridCol w="1155838">
                   <a:extLst>
                     <a:ext uri="{9D8B030D-6E8A-4147-A177-3AD203B41FA5}">
                       <a16:colId xmlns:a16="http://schemas.microsoft.com/office/drawing/2014/main" val="754126515"/>
                     </a:ext>
                   </a:extLst>
                 </a:gridCol>
-                <a:gridCol w="1374902">
+                <a:gridCol w="1437873">
                   <a:extLst>
                     <a:ext uri="{9D8B030D-6E8A-4147-A177-3AD203B41FA5}">
                       <a16:colId xmlns:a16="http://schemas.microsoft.com/office/drawing/2014/main" val="507640895"/>
@@ -6299,12 +6238,13 @@
                   </a:extLst>
                 </a:gridCol>
               </a:tblGrid>
-              <a:tr h="370840">
-                <a:tc>
-                  <a:txBody>
-                    <a:bodyPr/>
-                    <a:lstStyle/>
-                    <a:p>
+              <a:tr h="371149">
+                <a:tc>
+                  <a:txBody>
+                    <a:bodyPr/>
+                    <a:lstStyle/>
+                    <a:p>
+                      <a:pPr algn="l"/>
                       <a:r>
                         <a:rPr lang="de-DE" dirty="0"/>
                         <a:t>Thema</a:t>
@@ -6318,6 +6258,7 @@
                     <a:bodyPr/>
                     <a:lstStyle/>
                     <a:p>
+                      <a:pPr algn="l"/>
                       <a:r>
                         <a:rPr lang="de-DE" dirty="0"/>
                         <a:t>Kriterium</a:t>
@@ -6331,6 +6272,7 @@
                     <a:bodyPr/>
                     <a:lstStyle/>
                     <a:p>
+                      <a:pPr algn="l"/>
                       <a:r>
                         <a:rPr lang="de-DE" dirty="0"/>
                         <a:t>Gatling</a:t>
@@ -6344,6 +6286,7 @@
                     <a:bodyPr/>
                     <a:lstStyle/>
                     <a:p>
+                      <a:pPr algn="l"/>
                       <a:r>
                         <a:rPr lang="de-DE" dirty="0" err="1"/>
                         <a:t>Locust</a:t>
@@ -6358,6 +6301,7 @@
                     <a:bodyPr/>
                     <a:lstStyle/>
                     <a:p>
+                      <a:pPr algn="l"/>
                       <a:r>
                         <a:rPr lang="de-DE" dirty="0"/>
                         <a:t>Apache AB</a:t>
@@ -6371,6 +6315,7 @@
                     <a:bodyPr/>
                     <a:lstStyle/>
                     <a:p>
+                      <a:pPr algn="l"/>
                       <a:r>
                         <a:rPr lang="de-DE" dirty="0"/>
                         <a:t>k6</a:t>
@@ -6384,17 +6329,10 @@
                     <a:bodyPr/>
                     <a:lstStyle/>
                     <a:p>
+                      <a:pPr algn="l"/>
                       <a:r>
                         <a:rPr lang="de-DE" dirty="0" err="1"/>
-                        <a:t>Bees</a:t>
-                      </a:r>
-                      <a:r>
-                        <a:rPr lang="de-DE" dirty="0"/>
-                        <a:t> </a:t>
-                      </a:r>
-                      <a:r>
-                        <a:rPr lang="de-DE" dirty="0" err="1"/>
-                        <a:t>wM</a:t>
+                        <a:t>nGrinder</a:t>
                       </a:r>
                       <a:endParaRPr lang="de-DE" dirty="0"/>
                     </a:p>
@@ -6406,6 +6344,7 @@
                     <a:bodyPr/>
                     <a:lstStyle/>
                     <a:p>
+                      <a:pPr algn="l"/>
                       <a:r>
                         <a:rPr lang="de-DE" dirty="0"/>
                         <a:t>Taurus</a:t>
@@ -6420,12 +6359,13 @@
                   </a:ext>
                 </a:extLst>
               </a:tr>
-              <a:tr h="370840">
-                <a:tc>
-                  <a:txBody>
-                    <a:bodyPr/>
-                    <a:lstStyle/>
-                    <a:p>
+              <a:tr h="371149">
+                <a:tc>
+                  <a:txBody>
+                    <a:bodyPr/>
+                    <a:lstStyle/>
+                    <a:p>
+                      <a:pPr algn="l"/>
                       <a:r>
                         <a:rPr lang="de-DE" dirty="0"/>
                         <a:t>Mängel / Bugs</a:t>
@@ -6439,6 +6379,7 @@
                     <a:bodyPr/>
                     <a:lstStyle/>
                     <a:p>
+                      <a:pPr algn="l"/>
                       <a:r>
                         <a:rPr lang="de-DE" dirty="0"/>
                         <a:t>Kritische Bugs?</a:t>
@@ -6452,6 +6393,7 @@
                     <a:bodyPr/>
                     <a:lstStyle/>
                     <a:p>
+                      <a:pPr algn="l"/>
                       <a:endParaRPr lang="de-DE" dirty="0"/>
                     </a:p>
                   </a:txBody>
@@ -6466,6 +6408,7 @@
                     <a:bodyPr/>
                     <a:lstStyle/>
                     <a:p>
+                      <a:pPr algn="l"/>
                       <a:endParaRPr lang="de-DE" dirty="0"/>
                     </a:p>
                   </a:txBody>
@@ -6480,6 +6423,7 @@
                     <a:bodyPr/>
                     <a:lstStyle/>
                     <a:p>
+                      <a:pPr algn="l"/>
                       <a:endParaRPr lang="de-DE" dirty="0"/>
                     </a:p>
                   </a:txBody>
@@ -6494,6 +6438,7 @@
                     <a:bodyPr/>
                     <a:lstStyle/>
                     <a:p>
+                      <a:pPr algn="l"/>
                       <a:endParaRPr lang="de-DE" dirty="0"/>
                     </a:p>
                   </a:txBody>
@@ -6508,6 +6453,7 @@
                     <a:bodyPr/>
                     <a:lstStyle/>
                     <a:p>
+                      <a:pPr algn="l"/>
                       <a:endParaRPr lang="de-DE" dirty="0"/>
                     </a:p>
                   </a:txBody>
@@ -6522,6 +6468,7 @@
                     <a:bodyPr/>
                     <a:lstStyle/>
                     <a:p>
+                      <a:pPr algn="l"/>
                       <a:endParaRPr lang="de-DE" dirty="0"/>
                     </a:p>
                   </a:txBody>
@@ -6537,12 +6484,13 @@
                   </a:ext>
                 </a:extLst>
               </a:tr>
-              <a:tr h="370840">
+              <a:tr h="371149">
                 <a:tc rowSpan="2">
                   <a:txBody>
                     <a:bodyPr/>
                     <a:lstStyle/>
                     <a:p>
+                      <a:pPr algn="l"/>
                       <a:r>
                         <a:rPr lang="de-DE" dirty="0"/>
                         <a:t>Bekanntheitsgrad</a:t>
@@ -6556,6 +6504,7 @@
                     <a:bodyPr/>
                     <a:lstStyle/>
                     <a:p>
+                      <a:pPr algn="l"/>
                       <a:r>
                         <a:rPr lang="de-DE" dirty="0" err="1"/>
                         <a:t>GoogleTrends</a:t>
@@ -6570,6 +6519,7 @@
                     <a:bodyPr/>
                     <a:lstStyle/>
                     <a:p>
+                      <a:pPr algn="l"/>
                       <a:endParaRPr lang="de-DE" dirty="0"/>
                     </a:p>
                   </a:txBody>
@@ -6584,6 +6534,7 @@
                     <a:bodyPr/>
                     <a:lstStyle/>
                     <a:p>
+                      <a:pPr algn="l"/>
                       <a:endParaRPr lang="de-DE" dirty="0"/>
                     </a:p>
                   </a:txBody>
@@ -6598,6 +6549,7 @@
                     <a:bodyPr/>
                     <a:lstStyle/>
                     <a:p>
+                      <a:pPr algn="l"/>
                       <a:endParaRPr lang="de-DE" dirty="0"/>
                     </a:p>
                   </a:txBody>
@@ -6608,6 +6560,7 @@
                     <a:bodyPr/>
                     <a:lstStyle/>
                     <a:p>
+                      <a:pPr algn="l"/>
                       <a:endParaRPr lang="de-DE" dirty="0"/>
                     </a:p>
                   </a:txBody>
@@ -6622,6 +6575,7 @@
                     <a:bodyPr/>
                     <a:lstStyle/>
                     <a:p>
+                      <a:pPr algn="l"/>
                       <a:endParaRPr lang="de-DE" dirty="0"/>
                     </a:p>
                   </a:txBody>
@@ -6636,6 +6590,7 @@
                     <a:bodyPr/>
                     <a:lstStyle/>
                     <a:p>
+                      <a:pPr algn="l"/>
                       <a:endParaRPr lang="de-DE" dirty="0"/>
                     </a:p>
                   </a:txBody>
@@ -6651,7 +6606,7 @@
                   </a:ext>
                 </a:extLst>
               </a:tr>
-              <a:tr h="370840">
+              <a:tr h="371149">
                 <a:tc vMerge="1">
                   <a:txBody>
                     <a:bodyPr/>
@@ -6667,6 +6622,7 @@
                     <a:bodyPr/>
                     <a:lstStyle/>
                     <a:p>
+                      <a:pPr algn="l"/>
                       <a:r>
                         <a:rPr lang="de-DE" dirty="0" err="1"/>
                         <a:t>StackOverflow</a:t>
@@ -6681,6 +6637,7 @@
                     <a:bodyPr/>
                     <a:lstStyle/>
                     <a:p>
+                      <a:pPr algn="l"/>
                       <a:endParaRPr lang="de-DE" dirty="0"/>
                     </a:p>
                   </a:txBody>
@@ -6695,6 +6652,7 @@
                     <a:bodyPr/>
                     <a:lstStyle/>
                     <a:p>
+                      <a:pPr algn="l"/>
                       <a:endParaRPr lang="de-DE" dirty="0"/>
                     </a:p>
                   </a:txBody>
@@ -6709,6 +6667,7 @@
                     <a:bodyPr/>
                     <a:lstStyle/>
                     <a:p>
+                      <a:pPr algn="l"/>
                       <a:endParaRPr lang="de-DE" dirty="0"/>
                     </a:p>
                   </a:txBody>
@@ -6719,6 +6678,7 @@
                     <a:bodyPr/>
                     <a:lstStyle/>
                     <a:p>
+                      <a:pPr algn="l"/>
                       <a:endParaRPr lang="de-DE" dirty="0"/>
                     </a:p>
                   </a:txBody>
@@ -6733,6 +6693,7 @@
                     <a:bodyPr/>
                     <a:lstStyle/>
                     <a:p>
+                      <a:pPr algn="l"/>
                       <a:endParaRPr lang="de-DE" dirty="0"/>
                     </a:p>
                   </a:txBody>
@@ -6747,6 +6708,7 @@
                     <a:bodyPr/>
                     <a:lstStyle/>
                     <a:p>
+                      <a:pPr algn="l"/>
                       <a:endParaRPr lang="de-DE" dirty="0"/>
                     </a:p>
                   </a:txBody>
@@ -6762,13 +6724,12 @@
                   </a:ext>
                 </a:extLst>
               </a:tr>
-              <a:tr h="370840">
-                <a:tc rowSpan="2">
-                  <a:txBody>
-                    <a:bodyPr/>
-                    <a:lstStyle/>
-                    <a:p>
-                      <a:pPr algn="l"/>
+              <a:tr h="640613">
+                <a:tc>
+                  <a:txBody>
+                    <a:bodyPr/>
+                    <a:lstStyle/>
+                    <a:p>
                       <a:r>
                         <a:rPr lang="de-DE" dirty="0"/>
                         <a:t>Innere Qualität</a:t>
@@ -6782,114 +6743,14 @@
                     <a:bodyPr/>
                     <a:lstStyle/>
                     <a:p>
-                      <a:r>
-                        <a:rPr lang="de-DE" dirty="0" err="1"/>
-                        <a:t>Build</a:t>
-                      </a:r>
-                      <a:r>
-                        <a:rPr lang="de-DE" dirty="0"/>
-                        <a:t>-Skript baut</a:t>
-                      </a:r>
-                    </a:p>
-                  </a:txBody>
-                  <a:tcPr/>
-                </a:tc>
-                <a:tc>
-                  <a:txBody>
-                    <a:bodyPr/>
-                    <a:lstStyle/>
-                    <a:p>
-                      <a:endParaRPr lang="de-DE" dirty="0"/>
-                    </a:p>
-                  </a:txBody>
-                  <a:tcPr>
-                    <a:solidFill>
-                      <a:srgbClr val="92D050"/>
-                    </a:solidFill>
-                  </a:tcPr>
-                </a:tc>
-                <a:tc>
-                  <a:txBody>
-                    <a:bodyPr/>
-                    <a:lstStyle/>
-                    <a:p>
-                      <a:endParaRPr lang="de-DE" dirty="0"/>
-                    </a:p>
-                  </a:txBody>
-                  <a:tcPr>
-                    <a:solidFill>
-                      <a:srgbClr val="92D050"/>
-                    </a:solidFill>
-                  </a:tcPr>
-                </a:tc>
-                <a:tc>
-                  <a:txBody>
-                    <a:bodyPr/>
-                    <a:lstStyle/>
-                    <a:p>
-                      <a:endParaRPr lang="de-DE" dirty="0"/>
-                    </a:p>
-                  </a:txBody>
-                  <a:tcPr/>
-                </a:tc>
-                <a:tc>
-                  <a:txBody>
-                    <a:bodyPr/>
-                    <a:lstStyle/>
-                    <a:p>
-                      <a:endParaRPr lang="de-DE" dirty="0"/>
-                    </a:p>
-                  </a:txBody>
-                  <a:tcPr/>
-                </a:tc>
-                <a:tc>
-                  <a:txBody>
-                    <a:bodyPr/>
-                    <a:lstStyle/>
-                    <a:p>
-                      <a:endParaRPr lang="de-DE" dirty="0"/>
-                    </a:p>
-                  </a:txBody>
-                  <a:tcPr/>
-                </a:tc>
-                <a:tc>
-                  <a:txBody>
-                    <a:bodyPr/>
-                    <a:lstStyle/>
-                    <a:p>
-                      <a:endParaRPr lang="de-DE" dirty="0"/>
-                    </a:p>
-                  </a:txBody>
-                  <a:tcPr/>
-                </a:tc>
-                <a:extLst>
-                  <a:ext uri="{0D108BD9-81ED-4DB2-BD59-A6C34878D82A}">
-                    <a16:rowId xmlns:a16="http://schemas.microsoft.com/office/drawing/2014/main" val="4285906766"/>
-                  </a:ext>
-                </a:extLst>
-              </a:tr>
-              <a:tr h="370840">
-                <a:tc vMerge="1">
-                  <a:txBody>
-                    <a:bodyPr/>
-                    <a:lstStyle/>
-                    <a:p>
-                      <a:endParaRPr lang="de-DE" dirty="0"/>
-                    </a:p>
-                  </a:txBody>
-                  <a:tcPr/>
-                </a:tc>
-                <a:tc>
-                  <a:txBody>
-                    <a:bodyPr/>
-                    <a:lstStyle/>
-                    <a:p>
+                      <a:pPr algn="l"/>
                       <a:r>
                         <a:rPr lang="de-DE" dirty="0"/>
                         <a:t>Coverage &gt; 30%</a:t>
                       </a:r>
                     </a:p>
                     <a:p>
+                      <a:pPr algn="l"/>
                       <a:r>
                         <a:rPr lang="de-DE" dirty="0"/>
                         <a:t>Comments &gt; 15%</a:t>
@@ -6903,37 +6764,60 @@
                     <a:bodyPr/>
                     <a:lstStyle/>
                     <a:p>
+                      <a:pPr algn="l"/>
                       <a:r>
                         <a:rPr lang="de-DE" dirty="0"/>
                         <a:t>0%</a:t>
                       </a:r>
                     </a:p>
                     <a:p>
+                      <a:pPr algn="l"/>
                       <a:r>
                         <a:rPr lang="de-DE" dirty="0"/>
                         <a:t>3.2%</a:t>
                       </a:r>
                     </a:p>
                   </a:txBody>
-                  <a:tcPr/>
-                </a:tc>
-                <a:tc>
-                  <a:txBody>
-                    <a:bodyPr/>
-                    <a:lstStyle/>
-                    <a:p>
+                  <a:tcPr>
+                    <a:solidFill>
+                      <a:srgbClr val="FF0000"/>
+                    </a:solidFill>
+                  </a:tcPr>
+                </a:tc>
+                <a:tc>
+                  <a:txBody>
+                    <a:bodyPr/>
+                    <a:lstStyle/>
+                    <a:p>
+                      <a:pPr algn="l"/>
                       <a:r>
                         <a:rPr lang="de-DE" dirty="0"/>
                         <a:t>27%</a:t>
                       </a:r>
                     </a:p>
                     <a:p>
+                      <a:pPr algn="l"/>
                       <a:r>
                         <a:rPr lang="de-DE" dirty="0"/>
                         <a:t>13.4%</a:t>
                       </a:r>
                     </a:p>
                   </a:txBody>
+                  <a:tcPr>
+                    <a:solidFill>
+                      <a:srgbClr val="FFFF00"/>
+                    </a:solidFill>
+                  </a:tcPr>
+                </a:tc>
+                <a:tc>
+                  <a:txBody>
+                    <a:bodyPr/>
+                    <a:lstStyle/>
+                    <a:p>
+                      <a:pPr algn="l"/>
+                      <a:endParaRPr lang="de-DE" dirty="0"/>
+                    </a:p>
+                  </a:txBody>
                   <a:tcPr/>
                 </a:tc>
                 <a:tc>
@@ -6941,37 +6825,30 @@
                     <a:bodyPr/>
                     <a:lstStyle/>
                     <a:p>
+                      <a:pPr algn="l"/>
+                      <a:endParaRPr lang="de-DE"/>
+                    </a:p>
+                  </a:txBody>
+                  <a:tcPr/>
+                </a:tc>
+                <a:tc>
+                  <a:txBody>
+                    <a:bodyPr/>
+                    <a:lstStyle/>
+                    <a:p>
+                      <a:pPr algn="l"/>
+                      <a:endParaRPr lang="de-DE"/>
+                    </a:p>
+                  </a:txBody>
+                  <a:tcPr/>
+                </a:tc>
+                <a:tc>
+                  <a:txBody>
+                    <a:bodyPr/>
+                    <a:lstStyle/>
+                    <a:p>
+                      <a:pPr algn="l"/>
                       <a:endParaRPr lang="de-DE" dirty="0"/>
-                    </a:p>
-                  </a:txBody>
-                  <a:tcPr/>
-                </a:tc>
-                <a:tc>
-                  <a:txBody>
-                    <a:bodyPr/>
-                    <a:lstStyle/>
-                    <a:p>
-                      <a:endParaRPr lang="de-DE"/>
-                    </a:p>
-                  </a:txBody>
-                  <a:tcPr/>
-                </a:tc>
-                <a:tc>
-                  <a:txBody>
-                    <a:bodyPr/>
-                    <a:lstStyle/>
-                    <a:p>
-                      <a:endParaRPr lang="de-DE"/>
-                    </a:p>
-                  </a:txBody>
-                  <a:tcPr/>
-                </a:tc>
-                <a:tc>
-                  <a:txBody>
-                    <a:bodyPr/>
-                    <a:lstStyle/>
-                    <a:p>
-                      <a:endParaRPr lang="de-DE"/>
                     </a:p>
                   </a:txBody>
                   <a:tcPr/>
@@ -6982,12 +6859,13 @@
                   </a:ext>
                 </a:extLst>
               </a:tr>
-              <a:tr h="370840">
+              <a:tr h="371149">
                 <a:tc rowSpan="4">
                   <a:txBody>
                     <a:bodyPr/>
                     <a:lstStyle/>
                     <a:p>
+                      <a:pPr algn="l"/>
                       <a:r>
                         <a:rPr lang="de-DE" dirty="0"/>
                         <a:t>Projekt Aktivität</a:t>
@@ -7001,6 +6879,7 @@
                     <a:bodyPr/>
                     <a:lstStyle/>
                     <a:p>
+                      <a:pPr algn="l"/>
                       <a:r>
                         <a:rPr lang="de-DE" dirty="0"/>
                         <a:t>Auf </a:t>
@@ -7022,78 +6901,108 @@
                     <a:bodyPr/>
                     <a:lstStyle/>
                     <a:p>
+                      <a:pPr algn="l"/>
                       <a:r>
                         <a:rPr lang="de-DE" dirty="0"/>
                         <a:t>Ja</a:t>
                       </a:r>
                     </a:p>
                   </a:txBody>
-                  <a:tcPr/>
-                </a:tc>
-                <a:tc>
-                  <a:txBody>
-                    <a:bodyPr/>
-                    <a:lstStyle/>
-                    <a:p>
+                  <a:tcPr>
+                    <a:solidFill>
+                      <a:srgbClr val="92D050"/>
+                    </a:solidFill>
+                  </a:tcPr>
+                </a:tc>
+                <a:tc>
+                  <a:txBody>
+                    <a:bodyPr/>
+                    <a:lstStyle/>
+                    <a:p>
+                      <a:pPr algn="l"/>
                       <a:r>
                         <a:rPr lang="de-DE" dirty="0"/>
                         <a:t>Ja</a:t>
                       </a:r>
                     </a:p>
                   </a:txBody>
-                  <a:tcPr/>
-                </a:tc>
-                <a:tc>
-                  <a:txBody>
-                    <a:bodyPr/>
-                    <a:lstStyle/>
-                    <a:p>
+                  <a:tcPr>
+                    <a:solidFill>
+                      <a:srgbClr val="92D050"/>
+                    </a:solidFill>
+                  </a:tcPr>
+                </a:tc>
+                <a:tc>
+                  <a:txBody>
+                    <a:bodyPr/>
+                    <a:lstStyle/>
+                    <a:p>
+                      <a:pPr algn="l"/>
                       <a:r>
                         <a:rPr lang="de-DE" dirty="0"/>
                         <a:t>Ja</a:t>
                       </a:r>
                     </a:p>
                   </a:txBody>
-                  <a:tcPr/>
-                </a:tc>
-                <a:tc>
-                  <a:txBody>
-                    <a:bodyPr/>
-                    <a:lstStyle/>
-                    <a:p>
+                  <a:tcPr>
+                    <a:solidFill>
+                      <a:srgbClr val="92D050"/>
+                    </a:solidFill>
+                  </a:tcPr>
+                </a:tc>
+                <a:tc>
+                  <a:txBody>
+                    <a:bodyPr/>
+                    <a:lstStyle/>
+                    <a:p>
+                      <a:pPr algn="l"/>
                       <a:r>
                         <a:rPr lang="de-DE" dirty="0"/>
                         <a:t>Nein</a:t>
                       </a:r>
                     </a:p>
                   </a:txBody>
-                  <a:tcPr/>
-                </a:tc>
-                <a:tc>
-                  <a:txBody>
-                    <a:bodyPr/>
-                    <a:lstStyle/>
-                    <a:p>
+                  <a:tcPr>
+                    <a:solidFill>
+                      <a:srgbClr val="FF0000"/>
+                    </a:solidFill>
+                  </a:tcPr>
+                </a:tc>
+                <a:tc>
+                  <a:txBody>
+                    <a:bodyPr/>
+                    <a:lstStyle/>
+                    <a:p>
+                      <a:pPr algn="l"/>
+                      <a:r>
+                        <a:rPr lang="de-DE" dirty="0"/>
+                        <a:t>Ja</a:t>
+                      </a:r>
+                    </a:p>
+                  </a:txBody>
+                  <a:tcPr>
+                    <a:solidFill>
+                      <a:srgbClr val="92D050"/>
+                    </a:solidFill>
+                  </a:tcPr>
+                </a:tc>
+                <a:tc>
+                  <a:txBody>
+                    <a:bodyPr/>
+                    <a:lstStyle/>
+                    <a:p>
+                      <a:pPr algn="l"/>
                       <a:r>
                         <a:rPr lang="de-DE" dirty="0"/>
                         <a:t>Nein</a:t>
                       </a:r>
                     </a:p>
                   </a:txBody>
-                  <a:tcPr/>
-                </a:tc>
-                <a:tc>
-                  <a:txBody>
-                    <a:bodyPr/>
-                    <a:lstStyle/>
-                    <a:p>
-                      <a:r>
-                        <a:rPr lang="de-DE" dirty="0"/>
-                        <a:t>Nein</a:t>
-                      </a:r>
-                    </a:p>
-                  </a:txBody>
-                  <a:tcPr/>
+                  <a:tcPr>
+                    <a:solidFill>
+                      <a:srgbClr val="FF0000"/>
+                    </a:solidFill>
+                  </a:tcPr>
                 </a:tc>
                 <a:extLst>
                   <a:ext uri="{0D108BD9-81ED-4DB2-BD59-A6C34878D82A}">
@@ -7101,7 +7010,7 @@
                   </a:ext>
                 </a:extLst>
               </a:tr>
-              <a:tr h="370840">
+              <a:tr h="640613">
                 <a:tc vMerge="1">
                   <a:txBody>
                     <a:bodyPr/>
@@ -7117,6 +7026,7 @@
                     <a:bodyPr/>
                     <a:lstStyle/>
                     <a:p>
+                      <a:pPr algn="l"/>
                       <a:r>
                         <a:rPr lang="de-DE" dirty="0"/>
                         <a:t>Min. 1 Release im letzten Jahr</a:t>
@@ -7130,25 +7040,46 @@
                     <a:bodyPr/>
                     <a:lstStyle/>
                     <a:p>
+                      <a:pPr algn="l"/>
                       <a:r>
                         <a:rPr lang="de-DE" dirty="0"/>
-                        <a:t>Nein</a:t>
+                        <a:t>04/2016</a:t>
                       </a:r>
                     </a:p>
                   </a:txBody>
-                  <a:tcPr/>
-                </a:tc>
-                <a:tc>
-                  <a:txBody>
-                    <a:bodyPr/>
-                    <a:lstStyle/>
-                    <a:p>
+                  <a:tcPr>
+                    <a:solidFill>
+                      <a:srgbClr val="FF0000"/>
+                    </a:solidFill>
+                  </a:tcPr>
+                </a:tc>
+                <a:tc>
+                  <a:txBody>
+                    <a:bodyPr/>
+                    <a:lstStyle/>
+                    <a:p>
+                      <a:pPr algn="l"/>
                       <a:r>
                         <a:rPr lang="de-DE" dirty="0"/>
-                        <a:t>Ja, 09/2017</a:t>
+                        <a:t>09/2017</a:t>
                       </a:r>
                     </a:p>
                   </a:txBody>
+                  <a:tcPr>
+                    <a:solidFill>
+                      <a:srgbClr val="92D050"/>
+                    </a:solidFill>
+                  </a:tcPr>
+                </a:tc>
+                <a:tc>
+                  <a:txBody>
+                    <a:bodyPr/>
+                    <a:lstStyle/>
+                    <a:p>
+                      <a:pPr algn="l"/>
+                      <a:endParaRPr lang="de-DE" dirty="0"/>
+                    </a:p>
+                  </a:txBody>
                   <a:tcPr/>
                 </a:tc>
                 <a:tc>
@@ -7156,36 +7087,43 @@
                     <a:bodyPr/>
                     <a:lstStyle/>
                     <a:p>
-                      <a:endParaRPr lang="de-DE" dirty="0"/>
-                    </a:p>
-                  </a:txBody>
-                  <a:tcPr/>
-                </a:tc>
-                <a:tc>
-                  <a:txBody>
-                    <a:bodyPr/>
-                    <a:lstStyle/>
-                    <a:p>
-                      <a:endParaRPr lang="de-DE" dirty="0"/>
-                    </a:p>
-                  </a:txBody>
-                  <a:tcPr/>
-                </a:tc>
-                <a:tc>
-                  <a:txBody>
-                    <a:bodyPr/>
-                    <a:lstStyle/>
-                    <a:p>
-                      <a:endParaRPr lang="de-DE" dirty="0"/>
-                    </a:p>
-                  </a:txBody>
-                  <a:tcPr/>
-                </a:tc>
-                <a:tc>
-                  <a:txBody>
-                    <a:bodyPr/>
-                    <a:lstStyle/>
-                    <a:p>
+                      <a:pPr algn="l"/>
+                      <a:r>
+                        <a:rPr lang="de-DE" dirty="0"/>
+                        <a:t>03/2018</a:t>
+                      </a:r>
+                    </a:p>
+                  </a:txBody>
+                  <a:tcPr>
+                    <a:solidFill>
+                      <a:srgbClr val="92D050"/>
+                    </a:solidFill>
+                  </a:tcPr>
+                </a:tc>
+                <a:tc>
+                  <a:txBody>
+                    <a:bodyPr/>
+                    <a:lstStyle/>
+                    <a:p>
+                      <a:pPr algn="l"/>
+                      <a:r>
+                        <a:rPr lang="de-DE" dirty="0"/>
+                        <a:t>02/2017</a:t>
+                      </a:r>
+                    </a:p>
+                  </a:txBody>
+                  <a:tcPr>
+                    <a:solidFill>
+                      <a:srgbClr val="92D050"/>
+                    </a:solidFill>
+                  </a:tcPr>
+                </a:tc>
+                <a:tc>
+                  <a:txBody>
+                    <a:bodyPr/>
+                    <a:lstStyle/>
+                    <a:p>
+                      <a:pPr algn="l"/>
                       <a:endParaRPr lang="de-DE" dirty="0"/>
                     </a:p>
                   </a:txBody>
@@ -7197,7 +7135,7 @@
                   </a:ext>
                 </a:extLst>
               </a:tr>
-              <a:tr h="370840">
+              <a:tr h="371149">
                 <a:tc vMerge="1">
                   <a:txBody>
                     <a:bodyPr/>
@@ -7213,6 +7151,7 @@
                     <a:bodyPr/>
                     <a:lstStyle/>
                     <a:p>
+                      <a:pPr algn="l"/>
                       <a:r>
                         <a:rPr lang="de-DE" dirty="0"/>
                         <a:t>Min. 3 aktive </a:t>
@@ -7231,25 +7170,46 @@
                     <a:bodyPr/>
                     <a:lstStyle/>
                     <a:p>
+                      <a:pPr algn="l"/>
                       <a:r>
                         <a:rPr lang="de-DE" dirty="0"/>
                         <a:t>Ja</a:t>
                       </a:r>
                     </a:p>
                   </a:txBody>
-                  <a:tcPr/>
-                </a:tc>
-                <a:tc>
-                  <a:txBody>
-                    <a:bodyPr/>
-                    <a:lstStyle/>
-                    <a:p>
+                  <a:tcPr>
+                    <a:solidFill>
+                      <a:srgbClr val="92D050"/>
+                    </a:solidFill>
+                  </a:tcPr>
+                </a:tc>
+                <a:tc>
+                  <a:txBody>
+                    <a:bodyPr/>
+                    <a:lstStyle/>
+                    <a:p>
+                      <a:pPr algn="l"/>
                       <a:r>
                         <a:rPr lang="de-DE" dirty="0"/>
                         <a:t>Ja</a:t>
                       </a:r>
                     </a:p>
                   </a:txBody>
+                  <a:tcPr>
+                    <a:solidFill>
+                      <a:srgbClr val="92D050"/>
+                    </a:solidFill>
+                  </a:tcPr>
+                </a:tc>
+                <a:tc>
+                  <a:txBody>
+                    <a:bodyPr/>
+                    <a:lstStyle/>
+                    <a:p>
+                      <a:pPr algn="l"/>
+                      <a:endParaRPr lang="de-DE" dirty="0"/>
+                    </a:p>
+                  </a:txBody>
                   <a:tcPr/>
                 </a:tc>
                 <a:tc>
@@ -7257,6 +7217,7 @@
                     <a:bodyPr/>
                     <a:lstStyle/>
                     <a:p>
+                      <a:pPr algn="l"/>
                       <a:endParaRPr lang="de-DE" dirty="0"/>
                     </a:p>
                   </a:txBody>
@@ -7267,6 +7228,7 @@
                     <a:bodyPr/>
                     <a:lstStyle/>
                     <a:p>
+                      <a:pPr algn="l"/>
                       <a:endParaRPr lang="de-DE" dirty="0"/>
                     </a:p>
                   </a:txBody>
@@ -7277,16 +7239,7 @@
                     <a:bodyPr/>
                     <a:lstStyle/>
                     <a:p>
-                      <a:endParaRPr lang="de-DE" dirty="0"/>
-                    </a:p>
-                  </a:txBody>
-                  <a:tcPr/>
-                </a:tc>
-                <a:tc>
-                  <a:txBody>
-                    <a:bodyPr/>
-                    <a:lstStyle/>
-                    <a:p>
+                      <a:pPr algn="l"/>
                       <a:endParaRPr lang="de-DE" dirty="0"/>
                     </a:p>
                   </a:txBody>
@@ -7298,7 +7251,7 @@
                   </a:ext>
                 </a:extLst>
               </a:tr>
-              <a:tr h="370840">
+              <a:tr h="371149">
                 <a:tc vMerge="1">
                   <a:txBody>
                     <a:bodyPr/>
@@ -7314,6 +7267,7 @@
                     <a:bodyPr/>
                     <a:lstStyle/>
                     <a:p>
+                      <a:pPr algn="l"/>
                       <a:r>
                         <a:rPr lang="de-DE" dirty="0"/>
                         <a:t>Min. 1 Commit / Monat</a:t>
@@ -7327,6 +7281,7 @@
                     <a:bodyPr/>
                     <a:lstStyle/>
                     <a:p>
+                      <a:pPr algn="l"/>
                       <a:r>
                         <a:rPr lang="de-DE" dirty="0"/>
                         <a:t>Ja</a:t>
@@ -7340,6 +7295,7 @@
                     <a:bodyPr/>
                     <a:lstStyle/>
                     <a:p>
+                      <a:pPr algn="l"/>
                       <a:r>
                         <a:rPr lang="de-DE" dirty="0"/>
                         <a:t>Ja</a:t>
@@ -7353,6 +7309,7 @@
                     <a:bodyPr/>
                     <a:lstStyle/>
                     <a:p>
+                      <a:pPr algn="l"/>
                       <a:endParaRPr lang="de-DE" dirty="0"/>
                     </a:p>
                   </a:txBody>
@@ -7363,6 +7320,7 @@
                     <a:bodyPr/>
                     <a:lstStyle/>
                     <a:p>
+                      <a:pPr algn="l"/>
                       <a:endParaRPr lang="de-DE" dirty="0"/>
                     </a:p>
                   </a:txBody>
@@ -7373,6 +7331,7 @@
                     <a:bodyPr/>
                     <a:lstStyle/>
                     <a:p>
+                      <a:pPr algn="l"/>
                       <a:endParaRPr lang="de-DE" dirty="0"/>
                     </a:p>
                   </a:txBody>
@@ -7383,6 +7342,7 @@
                     <a:bodyPr/>
                     <a:lstStyle/>
                     <a:p>
+                      <a:pPr algn="l"/>
                       <a:endParaRPr lang="de-DE" dirty="0"/>
                     </a:p>
                   </a:txBody>
@@ -7539,7 +7499,7 @@
           <a:p>
             <a:fld id="{BBFFFFB7-B427-4FC9-89B5-E815E530C709}" type="datetime1">
               <a:rPr lang="de-DE" smtClean="0"/>
-              <a:t>09.05.2018</a:t>
+              <a:t>14.05.2018</a:t>
             </a:fld>
             <a:endParaRPr lang="de-DE"/>
           </a:p>
@@ -7752,15 +7712,15 @@
             </a:pPr>
             <a:r>
               <a:rPr lang="de-DE" dirty="0"/>
-              <a:t> Auf Codequalität geachtet beim </a:t>
+              <a:t> Durchführung der einzelnen Tests mithilfe von </a:t>
             </a:r>
             <a:r>
               <a:rPr lang="de-DE" dirty="0" err="1"/>
-              <a:t>WebService</a:t>
+              <a:t>Gradle</a:t>
             </a:r>
             <a:r>
               <a:rPr lang="de-DE" dirty="0"/>
-              <a:t> (siehe Sonar)</a:t>
+              <a:t> Tasks</a:t>
             </a:r>
           </a:p>
         </p:txBody>
@@ -7788,7 +7748,7 @@
           <a:p>
             <a:fld id="{5E3FA0F3-663C-4E4D-A9AD-FCEECA59737D}" type="datetime1">
               <a:rPr lang="de-DE" smtClean="0"/>
-              <a:t>09.05.2018</a:t>
+              <a:t>14.05.2018</a:t>
             </a:fld>
             <a:endParaRPr lang="de-DE"/>
           </a:p>
@@ -7967,7 +7927,7 @@
           <a:p>
             <a:fld id="{928650A1-1A79-48B9-A942-815D58127345}" type="datetime1">
               <a:rPr lang="de-DE" smtClean="0"/>
-              <a:t>09.05.2018</a:t>
+              <a:t>14.05.2018</a:t>
             </a:fld>
             <a:endParaRPr lang="de-DE"/>
           </a:p>
@@ -8113,7 +8073,7 @@
           <a:p>
             <a:fld id="{BBFFFFB7-B427-4FC9-89B5-E815E530C709}" type="datetime1">
               <a:rPr lang="de-DE" smtClean="0"/>
-              <a:t>09.05.2018</a:t>
+              <a:t>14.05.2018</a:t>
             </a:fld>
             <a:endParaRPr lang="de-DE"/>
           </a:p>
@@ -8330,7 +8290,7 @@
           <a:p>
             <a:fld id="{5E3FA0F3-663C-4E4D-A9AD-FCEECA59737D}" type="datetime1">
               <a:rPr lang="de-DE" smtClean="0"/>
-              <a:t>09.05.2018</a:t>
+              <a:t>14.05.2018</a:t>
             </a:fld>
             <a:endParaRPr lang="de-DE"/>
           </a:p>
@@ -8587,7 +8547,7 @@
           <a:p>
             <a:fld id="{5E3FA0F3-663C-4E4D-A9AD-FCEECA59737D}" type="datetime1">
               <a:rPr lang="de-DE" smtClean="0"/>
-              <a:t>09.05.2018</a:t>
+              <a:t>14.05.2018</a:t>
             </a:fld>
             <a:endParaRPr lang="de-DE"/>
           </a:p>
@@ -8728,7 +8688,7 @@
           <a:p>
             <a:fld id="{BBFFFFB7-B427-4FC9-89B5-E815E530C709}" type="datetime1">
               <a:rPr lang="de-DE" smtClean="0"/>
-              <a:t>09.05.2018</a:t>
+              <a:t>14.05.2018</a:t>
             </a:fld>
             <a:endParaRPr lang="de-DE"/>
           </a:p>
@@ -8930,7 +8890,7 @@
           <a:p>
             <a:fld id="{40945502-2D6D-4EF3-B5E9-AD6E136212A6}" type="datetime1">
               <a:rPr lang="de-DE" smtClean="0"/>
-              <a:t>09.05.2018</a:t>
+              <a:t>14.05.2018</a:t>
             </a:fld>
             <a:endParaRPr lang="de-DE"/>
           </a:p>
@@ -9181,7 +9141,7 @@
           <a:p>
             <a:fld id="{BBFFFFB7-B427-4FC9-89B5-E815E530C709}" type="datetime1">
               <a:rPr lang="de-DE" smtClean="0"/>
-              <a:t>09.05.2018</a:t>
+              <a:t>14.05.2018</a:t>
             </a:fld>
             <a:endParaRPr lang="de-DE"/>
           </a:p>
@@ -9399,7 +9359,7 @@
           <a:p>
             <a:fld id="{BBFFFFB7-B427-4FC9-89B5-E815E530C709}" type="datetime1">
               <a:rPr lang="de-DE" smtClean="0"/>
-              <a:t>09.05.2018</a:t>
+              <a:t>14.05.2018</a:t>
             </a:fld>
             <a:endParaRPr lang="de-DE"/>
           </a:p>
@@ -9469,7 +9429,7 @@
           <p:cNvPr id="2" name="Titel 1">
             <a:extLst>
               <a:ext uri="{FF2B5EF4-FFF2-40B4-BE49-F238E27FC236}">
-                <a16:creationId xmlns:a16="http://schemas.microsoft.com/office/drawing/2014/main" id="{FC5E778E-2A11-4C1E-8D8C-273067E4E86A}"/>
+                <a16:creationId xmlns:a16="http://schemas.microsoft.com/office/drawing/2014/main" id="{25465261-E22D-45A7-A775-4EE309F0CB55}"/>
               </a:ext>
             </a:extLst>
           </p:cNvPr>
@@ -9486,9 +9446,67 @@
           <a:lstStyle/>
           <a:p>
             <a:r>
+              <a:rPr lang="de-DE" dirty="0" err="1"/>
+              <a:t>nGrinder</a:t>
+            </a:r>
+            <a:endParaRPr lang="de-DE" dirty="0"/>
+          </a:p>
+        </p:txBody>
+      </p:sp>
+      <p:sp>
+        <p:nvSpPr>
+          <p:cNvPr id="3" name="Inhaltsplatzhalter 2">
+            <a:extLst>
+              <a:ext uri="{FF2B5EF4-FFF2-40B4-BE49-F238E27FC236}">
+                <a16:creationId xmlns:a16="http://schemas.microsoft.com/office/drawing/2014/main" id="{956F385F-9DDC-4FF5-BDAD-EFBB0A4BEE67}"/>
+              </a:ext>
+            </a:extLst>
+          </p:cNvPr>
+          <p:cNvSpPr>
+            <a:spLocks noGrp="1"/>
+          </p:cNvSpPr>
+          <p:nvPr>
+            <p:ph idx="1"/>
+          </p:nvPr>
+        </p:nvSpPr>
+        <p:spPr/>
+        <p:txBody>
+          <a:bodyPr/>
+          <a:lstStyle/>
+          <a:p>
+            <a:pPr>
+              <a:buFont typeface="Arial" panose="020B0604020202020204" pitchFamily="34" charset="0"/>
+              <a:buChar char="•"/>
+            </a:pPr>
+            <a:r>
               <a:rPr lang="de-DE" dirty="0"/>
-              <a:t>k6 </a:t>
-            </a:r>
+              <a:t> 2012 veröffentlicht (aktuell in Version 3.4.1)</a:t>
+            </a:r>
+          </a:p>
+          <a:p>
+            <a:pPr>
+              <a:buFont typeface="Arial" panose="020B0604020202020204" pitchFamily="34" charset="0"/>
+              <a:buChar char="•"/>
+            </a:pPr>
+            <a:r>
+              <a:rPr lang="de-DE" dirty="0"/>
+              <a:t> Apache Lizenz 2.0</a:t>
+            </a:r>
+          </a:p>
+          <a:p>
+            <a:pPr>
+              <a:buFont typeface="Arial" panose="020B0604020202020204" pitchFamily="34" charset="0"/>
+              <a:buChar char="•"/>
+            </a:pPr>
+            <a:r>
+              <a:rPr lang="de-DE" dirty="0"/>
+              <a:t> Programmiersprache: </a:t>
+            </a:r>
+            <a:r>
+              <a:rPr lang="de-DE" dirty="0" err="1"/>
+              <a:t>Jython</a:t>
+            </a:r>
+            <a:endParaRPr lang="de-DE" dirty="0"/>
           </a:p>
         </p:txBody>
       </p:sp>
@@ -9497,7 +9515,7 @@
           <p:cNvPr id="4" name="Datumsplatzhalter 3">
             <a:extLst>
               <a:ext uri="{FF2B5EF4-FFF2-40B4-BE49-F238E27FC236}">
-                <a16:creationId xmlns:a16="http://schemas.microsoft.com/office/drawing/2014/main" id="{DD0D5017-119E-4C58-9EF9-8EA436CBC7DC}"/>
+                <a16:creationId xmlns:a16="http://schemas.microsoft.com/office/drawing/2014/main" id="{FFB10ED8-02C7-48E8-A738-E334CC3316C4}"/>
               </a:ext>
             </a:extLst>
           </p:cNvPr>
@@ -9515,7 +9533,7 @@
           <a:p>
             <a:fld id="{BBFFFFB7-B427-4FC9-89B5-E815E530C709}" type="datetime1">
               <a:rPr lang="de-DE" smtClean="0"/>
-              <a:t>09.05.2018</a:t>
+              <a:t>14.05.2018</a:t>
             </a:fld>
             <a:endParaRPr lang="de-DE"/>
           </a:p>
@@ -9526,7 +9544,7 @@
           <p:cNvPr id="5" name="Foliennummernplatzhalter 4">
             <a:extLst>
               <a:ext uri="{FF2B5EF4-FFF2-40B4-BE49-F238E27FC236}">
-                <a16:creationId xmlns:a16="http://schemas.microsoft.com/office/drawing/2014/main" id="{942EAD44-7938-41E8-BB37-7A5A16FC2BD2}"/>
+                <a16:creationId xmlns:a16="http://schemas.microsoft.com/office/drawing/2014/main" id="{C1CC5C3A-0BBF-4937-9624-75E72F07D897}"/>
               </a:ext>
             </a:extLst>
           </p:cNvPr>
@@ -9550,64 +9568,12 @@
           </a:p>
         </p:txBody>
       </p:sp>
-      <p:sp>
-        <p:nvSpPr>
-          <p:cNvPr id="9" name="Inhaltsplatzhalter 8">
+      <p:pic>
+        <p:nvPicPr>
+          <p:cNvPr id="6" name="Grafik 5">
             <a:extLst>
               <a:ext uri="{FF2B5EF4-FFF2-40B4-BE49-F238E27FC236}">
-                <a16:creationId xmlns:a16="http://schemas.microsoft.com/office/drawing/2014/main" id="{856C14B4-A813-4D9C-8839-6D7097D8FA29}"/>
-              </a:ext>
-            </a:extLst>
-          </p:cNvPr>
-          <p:cNvSpPr>
-            <a:spLocks noGrp="1"/>
-          </p:cNvSpPr>
-          <p:nvPr>
-            <p:ph idx="1"/>
-          </p:nvPr>
-        </p:nvSpPr>
-        <p:spPr/>
-        <p:txBody>
-          <a:bodyPr/>
-          <a:lstStyle/>
-          <a:p>
-            <a:pPr>
-              <a:buFont typeface="Arial" panose="020B0604020202020204" pitchFamily="34" charset="0"/>
-              <a:buChar char="•"/>
-            </a:pPr>
-            <a:r>
-              <a:rPr lang="de-DE" dirty="0"/>
-              <a:t> 2016 veröffentlicht (aktuell in Version 0.20.0)</a:t>
-            </a:r>
-          </a:p>
-          <a:p>
-            <a:pPr>
-              <a:buFont typeface="Arial" panose="020B0604020202020204" pitchFamily="34" charset="0"/>
-              <a:buChar char="•"/>
-            </a:pPr>
-            <a:r>
-              <a:rPr lang="de-DE" dirty="0"/>
-              <a:t> AGPL Lizenz</a:t>
-            </a:r>
-          </a:p>
-          <a:p>
-            <a:pPr>
-              <a:buFont typeface="Arial" panose="020B0604020202020204" pitchFamily="34" charset="0"/>
-              <a:buChar char="•"/>
-            </a:pPr>
-            <a:r>
-              <a:rPr lang="de-DE" dirty="0"/>
-              <a:t> Programmiersprache: JavaScript und GO</a:t>
-            </a:r>
-          </a:p>
-        </p:txBody>
-      </p:sp>
-      <p:pic>
-        <p:nvPicPr>
-          <p:cNvPr id="3" name="Grafik 2">
-            <a:extLst>
-              <a:ext uri="{FF2B5EF4-FFF2-40B4-BE49-F238E27FC236}">
-                <a16:creationId xmlns:a16="http://schemas.microsoft.com/office/drawing/2014/main" id="{6F55CB92-7381-458D-9959-7EFD9B012DBA}"/>
+                <a16:creationId xmlns:a16="http://schemas.microsoft.com/office/drawing/2014/main" id="{85560B9E-5419-44F6-8859-4DCA30933AFF}"/>
               </a:ext>
             </a:extLst>
           </p:cNvPr>
@@ -9624,18 +9590,65 @@
         </p:blipFill>
         <p:spPr>
           <a:xfrm>
-            <a:off x="1097280" y="3397718"/>
-            <a:ext cx="10058400" cy="2471376"/>
+            <a:off x="1097281" y="3603594"/>
+            <a:ext cx="10058400" cy="2091755"/>
           </a:xfrm>
           <a:prstGeom prst="rect">
             <a:avLst/>
           </a:prstGeom>
         </p:spPr>
       </p:pic>
+      <p:pic>
+        <p:nvPicPr>
+          <p:cNvPr id="1026" name="Picture 2" descr="http://naver.github.io/ngrinder/images/logo_ngrinder_a_header_inv.png">
+            <a:extLst>
+              <a:ext uri="{FF2B5EF4-FFF2-40B4-BE49-F238E27FC236}">
+                <a16:creationId xmlns:a16="http://schemas.microsoft.com/office/drawing/2014/main" id="{EBFBA67F-76A7-4F5E-930B-5F5706F2A4AB}"/>
+              </a:ext>
+            </a:extLst>
+          </p:cNvPr>
+          <p:cNvPicPr>
+            <a:picLocks noChangeAspect="1" noChangeArrowheads="1"/>
+          </p:cNvPicPr>
+          <p:nvPr/>
+        </p:nvPicPr>
+        <p:blipFill>
+          <a:blip r:embed="rId3">
+            <a:extLst>
+              <a:ext uri="{28A0092B-C50C-407E-A947-70E740481C1C}">
+                <a14:useLocalDpi xmlns:a14="http://schemas.microsoft.com/office/drawing/2010/main" val="0"/>
+              </a:ext>
+            </a:extLst>
+          </a:blip>
+          <a:srcRect/>
+          <a:stretch>
+            <a:fillRect/>
+          </a:stretch>
+        </p:blipFill>
+        <p:spPr bwMode="auto">
+          <a:xfrm>
+            <a:off x="7910004" y="982963"/>
+            <a:ext cx="3302479" cy="544159"/>
+          </a:xfrm>
+          <a:prstGeom prst="rect">
+            <a:avLst/>
+          </a:prstGeom>
+          <a:noFill/>
+          <a:extLst>
+            <a:ext uri="{909E8E84-426E-40DD-AFC4-6F175D3DCCD1}">
+              <a14:hiddenFill xmlns:a14="http://schemas.microsoft.com/office/drawing/2010/main">
+                <a:solidFill>
+                  <a:srgbClr val="FFFFFF"/>
+                </a:solidFill>
+              </a14:hiddenFill>
+            </a:ext>
+          </a:extLst>
+        </p:spPr>
+      </p:pic>
     </p:spTree>
     <p:extLst>
       <p:ext uri="{BB962C8B-B14F-4D97-AF65-F5344CB8AC3E}">
-        <p14:creationId xmlns:p14="http://schemas.microsoft.com/office/powerpoint/2010/main" val="2213988132"/>
+        <p14:creationId xmlns:p14="http://schemas.microsoft.com/office/powerpoint/2010/main" val="3351800027"/>
       </p:ext>
     </p:extLst>
   </p:cSld>

</xml_diff>

<commit_message>
Updated some styling mistakes.
</commit_message>
<xml_diff>
--- a/LoadTesting.pptx
+++ b/LoadTesting.pptx
@@ -4680,14 +4680,14 @@
             <p:ph idx="1"/>
             <p:extLst>
               <p:ext uri="{D42A27DB-BD31-4B8C-83A1-F6EECF244321}">
-                <p14:modId xmlns:p14="http://schemas.microsoft.com/office/powerpoint/2010/main" val="2356859967"/>
+                <p14:modId xmlns:p14="http://schemas.microsoft.com/office/powerpoint/2010/main" val="3887764731"/>
               </p:ext>
             </p:extLst>
           </p:nvPr>
         </p:nvGraphicFramePr>
         <p:xfrm>
           <a:off x="146304" y="1827975"/>
-          <a:ext cx="11914316" cy="4399280"/>
+          <a:ext cx="11914316" cy="4673600"/>
         </p:xfrm>
         <a:graphic>
           <a:graphicData uri="http://schemas.openxmlformats.org/drawingml/2006/table">
@@ -5004,7 +5004,15 @@
                       </a:pPr>
                       <a:r>
                         <a:rPr lang="de-DE" dirty="0"/>
-                        <a:t>Testreport als HTML</a:t>
+                        <a:t>Testreport als HTML (</a:t>
+                      </a:r>
+                      <a:r>
+                        <a:rPr lang="de-DE" dirty="0" err="1"/>
+                        <a:t>default</a:t>
+                      </a:r>
+                      <a:r>
+                        <a:rPr lang="de-DE" dirty="0"/>
+                        <a:t>)</a:t>
                       </a:r>
                     </a:p>
                   </a:txBody>
@@ -5058,7 +5066,15 @@
                       </a:pPr>
                       <a:r>
                         <a:rPr lang="de-DE" dirty="0"/>
-                        <a:t>Testreport als HTML</a:t>
+                        <a:t>Testreport als HTML (nicht </a:t>
+                      </a:r>
+                      <a:r>
+                        <a:rPr lang="de-DE" dirty="0" err="1"/>
+                        <a:t>default</a:t>
+                      </a:r>
+                      <a:r>
+                        <a:rPr lang="de-DE" dirty="0"/>
+                        <a:t>)</a:t>
                       </a:r>
                     </a:p>
                   </a:txBody>
@@ -5095,7 +5111,7 @@
                       </a:pPr>
                       <a:r>
                         <a:rPr lang="de-DE" dirty="0"/>
-                        <a:t>Keine Scala Kenntnisse notwendig</a:t>
+                        <a:t>Keine Scala Kenntnisse notwendig (Doku erklärt notwendiges)</a:t>
                       </a:r>
                     </a:p>
                   </a:txBody>

</xml_diff>

<commit_message>
Update final comparison slide.
</commit_message>
<xml_diff>
--- a/LoadTesting.pptx
+++ b/LoadTesting.pptx
@@ -5,7 +5,7 @@
     <p:sldMasterId id="2147483672" r:id="rId1"/>
   </p:sldMasterIdLst>
   <p:notesMasterIdLst>
-    <p:notesMasterId r:id="rId13"/>
+    <p:notesMasterId r:id="rId14"/>
   </p:notesMasterIdLst>
   <p:sldIdLst>
     <p:sldId id="256" r:id="rId2"/>
@@ -18,7 +18,8 @@
     <p:sldId id="291" r:id="rId9"/>
     <p:sldId id="295" r:id="rId10"/>
     <p:sldId id="293" r:id="rId11"/>
-    <p:sldId id="288" r:id="rId12"/>
+    <p:sldId id="296" r:id="rId12"/>
+    <p:sldId id="288" r:id="rId13"/>
   </p:sldIdLst>
   <p:sldSz cx="12192000" cy="6858000"/>
   <p:notesSz cx="6858000" cy="9144000"/>
@@ -211,7 +212,7 @@
           <a:p>
             <a:fld id="{7F7A1CCF-3A8B-40F6-A64D-2A4687177E43}" type="datetimeFigureOut">
               <a:rPr lang="de-DE" smtClean="0"/>
-              <a:t>24.06.2018</a:t>
+              <a:t>26.06.2018</a:t>
             </a:fld>
             <a:endParaRPr lang="de-DE"/>
           </a:p>
@@ -618,6 +619,153 @@
     <p:extLst>
       <p:ext uri="{BB962C8B-B14F-4D97-AF65-F5344CB8AC3E}">
         <p14:creationId xmlns:p14="http://schemas.microsoft.com/office/powerpoint/2010/main" val="2049720491"/>
+      </p:ext>
+    </p:extLst>
+  </p:cSld>
+  <p:clrMapOvr>
+    <a:masterClrMapping/>
+  </p:clrMapOvr>
+</p:notes>
+</file>
+
+<file path=ppt/notesSlides/notesSlide2.xml><?xml version="1.0" encoding="utf-8"?>
+<p:notes xmlns:a="http://schemas.openxmlformats.org/drawingml/2006/main" xmlns:r="http://schemas.openxmlformats.org/officeDocument/2006/relationships" xmlns:p="http://schemas.openxmlformats.org/presentationml/2006/main">
+  <p:cSld>
+    <p:spTree>
+      <p:nvGrpSpPr>
+        <p:cNvPr id="1" name=""/>
+        <p:cNvGrpSpPr/>
+        <p:nvPr/>
+      </p:nvGrpSpPr>
+      <p:grpSpPr>
+        <a:xfrm>
+          <a:off x="0" y="0"/>
+          <a:ext cx="0" cy="0"/>
+          <a:chOff x="0" y="0"/>
+          <a:chExt cx="0" cy="0"/>
+        </a:xfrm>
+      </p:grpSpPr>
+      <p:sp>
+        <p:nvSpPr>
+          <p:cNvPr id="2" name="Folienbildplatzhalter 1"/>
+          <p:cNvSpPr>
+            <a:spLocks noGrp="1" noRot="1" noChangeAspect="1"/>
+          </p:cNvSpPr>
+          <p:nvPr>
+            <p:ph type="sldImg"/>
+          </p:nvPr>
+        </p:nvSpPr>
+        <p:spPr/>
+      </p:sp>
+      <p:sp>
+        <p:nvSpPr>
+          <p:cNvPr id="3" name="Notizenplatzhalter 2"/>
+          <p:cNvSpPr>
+            <a:spLocks noGrp="1"/>
+          </p:cNvSpPr>
+          <p:nvPr>
+            <p:ph type="body" idx="1"/>
+          </p:nvPr>
+        </p:nvSpPr>
+        <p:spPr/>
+        <p:txBody>
+          <a:bodyPr/>
+          <a:lstStyle/>
+          <a:p>
+            <a:r>
+              <a:rPr lang="de-DE" dirty="0"/>
+              <a:t>Gegenargumente:</a:t>
+            </a:r>
+          </a:p>
+          <a:p>
+            <a:pPr marL="171450" indent="-171450">
+              <a:buFontTx/>
+              <a:buChar char="-"/>
+            </a:pPr>
+            <a:r>
+              <a:rPr lang="de-DE" dirty="0" err="1"/>
+              <a:t>Slapper</a:t>
+            </a:r>
+            <a:r>
+              <a:rPr lang="de-DE" dirty="0"/>
+              <a:t>: CLI-Tool für simple Tests; Für Vergleich nicht genügend</a:t>
+            </a:r>
+          </a:p>
+          <a:p>
+            <a:pPr marL="171450" indent="-171450">
+              <a:buFontTx/>
+              <a:buChar char="-"/>
+            </a:pPr>
+            <a:r>
+              <a:rPr lang="de-DE" dirty="0" err="1"/>
+              <a:t>nGrinder</a:t>
+            </a:r>
+            <a:r>
+              <a:rPr lang="de-DE" dirty="0"/>
+              <a:t>: Geringes Interesse -&gt; keine hohe Verbreitung</a:t>
+            </a:r>
+          </a:p>
+          <a:p>
+            <a:pPr marL="171450" indent="-171450">
+              <a:buFontTx/>
+              <a:buChar char="-"/>
+            </a:pPr>
+            <a:r>
+              <a:rPr lang="de-DE" dirty="0"/>
+              <a:t>Apache Bench: CLI-Tool simple Tests</a:t>
+            </a:r>
+          </a:p>
+          <a:p>
+            <a:pPr marL="171450" indent="-171450">
+              <a:buFontTx/>
+              <a:buChar char="-"/>
+            </a:pPr>
+            <a:r>
+              <a:rPr lang="de-DE" dirty="0"/>
+              <a:t>k6: Keine Stable Version, kein </a:t>
+            </a:r>
+            <a:r>
+              <a:rPr lang="de-DE" dirty="0" err="1"/>
+              <a:t>OpenHub</a:t>
+            </a:r>
+            <a:r>
+              <a:rPr lang="de-DE" dirty="0"/>
+              <a:t>, </a:t>
+            </a:r>
+            <a:r>
+              <a:rPr lang="de-DE"/>
+              <a:t>AGPL Lizenz</a:t>
+            </a:r>
+          </a:p>
+        </p:txBody>
+      </p:sp>
+      <p:sp>
+        <p:nvSpPr>
+          <p:cNvPr id="4" name="Foliennummernplatzhalter 3"/>
+          <p:cNvSpPr>
+            <a:spLocks noGrp="1"/>
+          </p:cNvSpPr>
+          <p:nvPr>
+            <p:ph type="sldNum" sz="quarter" idx="10"/>
+          </p:nvPr>
+        </p:nvSpPr>
+        <p:spPr/>
+        <p:txBody>
+          <a:bodyPr/>
+          <a:lstStyle/>
+          <a:p>
+            <a:fld id="{D14C2DC8-7E40-4960-AC23-B60999404DF0}" type="slidenum">
+              <a:rPr lang="de-DE" smtClean="0"/>
+              <a:t>5</a:t>
+            </a:fld>
+            <a:endParaRPr lang="de-DE"/>
+          </a:p>
+        </p:txBody>
+      </p:sp>
+    </p:spTree>
+    <p:extLst>
+      <p:ext uri="{BB962C8B-B14F-4D97-AF65-F5344CB8AC3E}">
+        <p14:creationId xmlns:p14="http://schemas.microsoft.com/office/powerpoint/2010/main" val="2713186303"/>
       </p:ext>
     </p:extLst>
   </p:cSld>
@@ -4680,14 +4828,14 @@
             <p:ph idx="1"/>
             <p:extLst>
               <p:ext uri="{D42A27DB-BD31-4B8C-83A1-F6EECF244321}">
-                <p14:modId xmlns:p14="http://schemas.microsoft.com/office/powerpoint/2010/main" val="3887764731"/>
+                <p14:modId xmlns:p14="http://schemas.microsoft.com/office/powerpoint/2010/main" val="3386998633"/>
               </p:ext>
             </p:extLst>
           </p:nvPr>
         </p:nvGraphicFramePr>
         <p:xfrm>
           <a:off x="146304" y="1827975"/>
-          <a:ext cx="11914316" cy="4673600"/>
+          <a:ext cx="11955384" cy="4033520"/>
         </p:xfrm>
         <a:graphic>
           <a:graphicData uri="http://schemas.openxmlformats.org/drawingml/2006/table">
@@ -4696,28 +4844,28 @@
                 <a:tableStyleId>{5C22544A-7EE6-4342-B048-85BDC9FD1C3A}</a:tableStyleId>
               </a:tblPr>
               <a:tblGrid>
-                <a:gridCol w="2978579">
+                <a:gridCol w="2824770">
                   <a:extLst>
                     <a:ext uri="{9D8B030D-6E8A-4147-A177-3AD203B41FA5}">
                       <a16:colId xmlns:a16="http://schemas.microsoft.com/office/drawing/2014/main" val="4043243373"/>
                     </a:ext>
                   </a:extLst>
                 </a:gridCol>
-                <a:gridCol w="2978579">
+                <a:gridCol w="2517927">
                   <a:extLst>
                     <a:ext uri="{9D8B030D-6E8A-4147-A177-3AD203B41FA5}">
                       <a16:colId xmlns:a16="http://schemas.microsoft.com/office/drawing/2014/main" val="3224653980"/>
                     </a:ext>
                   </a:extLst>
                 </a:gridCol>
-                <a:gridCol w="2978579">
+                <a:gridCol w="3787917">
                   <a:extLst>
                     <a:ext uri="{9D8B030D-6E8A-4147-A177-3AD203B41FA5}">
                       <a16:colId xmlns:a16="http://schemas.microsoft.com/office/drawing/2014/main" val="1500568629"/>
                     </a:ext>
                   </a:extLst>
                 </a:gridCol>
-                <a:gridCol w="2978579">
+                <a:gridCol w="2824770">
                   <a:extLst>
                     <a:ext uri="{9D8B030D-6E8A-4147-A177-3AD203B41FA5}">
                       <a16:colId xmlns:a16="http://schemas.microsoft.com/office/drawing/2014/main" val="829322388"/>
@@ -4732,7 +4880,7 @@
                     <a:lstStyle/>
                     <a:p>
                       <a:r>
-                        <a:rPr lang="de-DE" dirty="0"/>
+                        <a:rPr lang="de-DE" sz="1600" dirty="0"/>
                         <a:t>Kriterium</a:t>
                       </a:r>
                     </a:p>
@@ -4745,7 +4893,7 @@
                     <a:lstStyle/>
                     <a:p>
                       <a:r>
-                        <a:rPr lang="de-DE" dirty="0"/>
+                        <a:rPr lang="de-DE" sz="1600" dirty="0"/>
                         <a:t>Gatling</a:t>
                       </a:r>
                     </a:p>
@@ -4758,10 +4906,10 @@
                     <a:lstStyle/>
                     <a:p>
                       <a:r>
-                        <a:rPr lang="de-DE" dirty="0" err="1"/>
+                        <a:rPr lang="de-DE" sz="1600" dirty="0" err="1"/>
                         <a:t>Locust</a:t>
                       </a:r>
-                      <a:endParaRPr lang="de-DE" dirty="0"/>
+                      <a:endParaRPr lang="de-DE" sz="1600" dirty="0"/>
                     </a:p>
                   </a:txBody>
                   <a:tcPr/>
@@ -4772,10 +4920,10 @@
                     <a:lstStyle/>
                     <a:p>
                       <a:r>
-                        <a:rPr lang="de-DE" dirty="0" err="1"/>
+                        <a:rPr lang="de-DE" sz="1600" dirty="0" err="1"/>
                         <a:t>Artillery</a:t>
                       </a:r>
-                      <a:endParaRPr lang="de-DE" dirty="0"/>
+                      <a:endParaRPr lang="de-DE" sz="1600" dirty="0"/>
                     </a:p>
                   </a:txBody>
                   <a:tcPr/>
@@ -4793,7 +4941,7 @@
                     <a:lstStyle/>
                     <a:p>
                       <a:r>
-                        <a:rPr lang="de-DE" dirty="0"/>
+                        <a:rPr lang="de-DE" sz="1600" dirty="0"/>
                         <a:t>Voraussetzungen</a:t>
                       </a:r>
                     </a:p>
@@ -4810,7 +4958,7 @@
                         <a:buChar char="•"/>
                       </a:pPr>
                       <a:r>
-                        <a:rPr lang="de-DE" dirty="0"/>
+                        <a:rPr lang="de-DE" sz="1600" dirty="0"/>
                         <a:t>JDK8</a:t>
                       </a:r>
                     </a:p>
@@ -4827,7 +4975,7 @@
                         <a:buChar char="•"/>
                       </a:pPr>
                       <a:r>
-                        <a:rPr lang="de-DE" dirty="0"/>
+                        <a:rPr lang="de-DE" sz="1600" dirty="0"/>
                         <a:t>Python 2.x bzw. 3.x</a:t>
                       </a:r>
                     </a:p>
@@ -4844,7 +4992,7 @@
                         <a:buChar char="•"/>
                       </a:pPr>
                       <a:r>
-                        <a:rPr lang="de-DE" dirty="0"/>
+                        <a:rPr lang="de-DE" sz="1600" dirty="0"/>
                         <a:t>Node.js</a:t>
                       </a:r>
                     </a:p>
@@ -4864,7 +5012,7 @@
                     <a:lstStyle/>
                     <a:p>
                       <a:r>
-                        <a:rPr lang="de-DE" dirty="0"/>
+                        <a:rPr lang="de-DE" sz="1600" dirty="0"/>
                         <a:t>Installationsmöglichkeiten</a:t>
                       </a:r>
                     </a:p>
@@ -4881,10 +5029,10 @@
                         <a:buChar char="•"/>
                       </a:pPr>
                       <a:r>
-                        <a:rPr lang="de-DE" dirty="0" err="1"/>
+                        <a:rPr lang="de-DE" sz="1600" dirty="0" err="1"/>
                         <a:t>Gradle</a:t>
                       </a:r>
-                      <a:endParaRPr lang="de-DE" dirty="0"/>
+                      <a:endParaRPr lang="de-DE" sz="1600" dirty="0"/>
                     </a:p>
                     <a:p>
                       <a:pPr marL="285750" indent="-285750">
@@ -4892,7 +5040,7 @@
                         <a:buChar char="•"/>
                       </a:pPr>
                       <a:r>
-                        <a:rPr lang="de-DE" dirty="0"/>
+                        <a:rPr lang="de-DE" sz="1600" dirty="0"/>
                         <a:t>ZIP Bundle</a:t>
                       </a:r>
                     </a:p>
@@ -4902,7 +5050,7 @@
                         <a:buChar char="•"/>
                       </a:pPr>
                       <a:r>
-                        <a:rPr lang="de-DE" dirty="0"/>
+                        <a:rPr lang="de-DE" sz="1600" dirty="0"/>
                         <a:t>Maven</a:t>
                       </a:r>
                     </a:p>
@@ -4919,14 +5067,14 @@
                         <a:buChar char="•"/>
                       </a:pPr>
                       <a:r>
-                        <a:rPr lang="de-DE" dirty="0"/>
+                        <a:rPr lang="de-DE" sz="1600" dirty="0"/>
                         <a:t>Python </a:t>
                       </a:r>
                       <a:r>
-                        <a:rPr lang="de-DE" dirty="0" err="1"/>
+                        <a:rPr lang="de-DE" sz="1600" dirty="0" err="1"/>
                         <a:t>pip</a:t>
                       </a:r>
-                      <a:endParaRPr lang="de-DE" dirty="0"/>
+                      <a:endParaRPr lang="de-DE" sz="1600" dirty="0"/>
                     </a:p>
                     <a:p>
                       <a:pPr marL="285750" indent="-285750">
@@ -4934,11 +5082,11 @@
                         <a:buChar char="•"/>
                       </a:pPr>
                       <a:r>
-                        <a:rPr lang="de-DE" dirty="0" err="1"/>
+                        <a:rPr lang="de-DE" sz="1600" dirty="0" err="1"/>
                         <a:t>Homebrew</a:t>
                       </a:r>
                       <a:r>
-                        <a:rPr lang="de-DE" dirty="0"/>
+                        <a:rPr lang="de-DE" sz="1600" dirty="0"/>
                         <a:t> (Mac)</a:t>
                       </a:r>
                     </a:p>
@@ -4955,10 +5103,10 @@
                         <a:buChar char="•"/>
                       </a:pPr>
                       <a:r>
-                        <a:rPr lang="de-DE" dirty="0" err="1"/>
+                        <a:rPr lang="de-DE" sz="1600" dirty="0" err="1"/>
                         <a:t>Npm</a:t>
                       </a:r>
-                      <a:endParaRPr lang="de-DE" dirty="0"/>
+                      <a:endParaRPr lang="de-DE" sz="1600" dirty="0"/>
                     </a:p>
                   </a:txBody>
                   <a:tcPr/>
@@ -4976,7 +5124,7 @@
                     <a:lstStyle/>
                     <a:p>
                       <a:r>
-                        <a:rPr lang="de-DE" dirty="0"/>
+                        <a:rPr lang="de-DE" sz="1600" dirty="0"/>
                         <a:t>Auswertbarkeit</a:t>
                       </a:r>
                     </a:p>
@@ -4993,7 +5141,7 @@
                         <a:buChar char="•"/>
                       </a:pPr>
                       <a:r>
-                        <a:rPr lang="de-DE" dirty="0"/>
+                        <a:rPr lang="de-DE" sz="1600" dirty="0"/>
                         <a:t>Ausgabe in Konsole</a:t>
                       </a:r>
                     </a:p>
@@ -5003,16 +5151,8 @@
                         <a:buChar char="•"/>
                       </a:pPr>
                       <a:r>
-                        <a:rPr lang="de-DE" dirty="0"/>
-                        <a:t>Testreport als HTML (</a:t>
-                      </a:r>
-                      <a:r>
-                        <a:rPr lang="de-DE" dirty="0" err="1"/>
-                        <a:t>default</a:t>
-                      </a:r>
-                      <a:r>
-                        <a:rPr lang="de-DE" dirty="0"/>
-                        <a:t>)</a:t>
+                        <a:rPr lang="de-DE" sz="1600" dirty="0"/>
+                        <a:t>Testreport als HTML</a:t>
                       </a:r>
                     </a:p>
                   </a:txBody>
@@ -5028,7 +5168,7 @@
                         <a:buChar char="•"/>
                       </a:pPr>
                       <a:r>
-                        <a:rPr lang="de-DE" dirty="0"/>
+                        <a:rPr lang="de-DE" sz="1600" dirty="0"/>
                         <a:t>Live-Dashboard (Browser)</a:t>
                       </a:r>
                     </a:p>
@@ -5038,7 +5178,7 @@
                         <a:buChar char="•"/>
                       </a:pPr>
                       <a:r>
-                        <a:rPr lang="de-DE" dirty="0"/>
+                        <a:rPr lang="de-DE" sz="1600" dirty="0"/>
                         <a:t>Report nach Testlauf</a:t>
                       </a:r>
                     </a:p>
@@ -5055,7 +5195,7 @@
                         <a:buChar char="•"/>
                       </a:pPr>
                       <a:r>
-                        <a:rPr lang="de-DE" dirty="0"/>
+                        <a:rPr lang="de-DE" sz="1600" dirty="0"/>
                         <a:t>Ausgabe in Konsole</a:t>
                       </a:r>
                     </a:p>
@@ -5065,16 +5205,8 @@
                         <a:buChar char="•"/>
                       </a:pPr>
                       <a:r>
-                        <a:rPr lang="de-DE" dirty="0"/>
-                        <a:t>Testreport als HTML (nicht </a:t>
-                      </a:r>
-                      <a:r>
-                        <a:rPr lang="de-DE" dirty="0" err="1"/>
-                        <a:t>default</a:t>
-                      </a:r>
-                      <a:r>
-                        <a:rPr lang="de-DE" dirty="0"/>
-                        <a:t>)</a:t>
+                        <a:rPr lang="de-DE" sz="1600" dirty="0"/>
+                        <a:t>Testreport als HTML</a:t>
                       </a:r>
                     </a:p>
                   </a:txBody>
@@ -5093,7 +5225,7 @@
                     <a:lstStyle/>
                     <a:p>
                       <a:r>
-                        <a:rPr lang="de-DE" dirty="0"/>
+                        <a:rPr lang="de-DE" sz="1600" dirty="0"/>
                         <a:t>Usability</a:t>
                       </a:r>
                     </a:p>
@@ -5110,8 +5242,8 @@
                         <a:buChar char="•"/>
                       </a:pPr>
                       <a:r>
-                        <a:rPr lang="de-DE" dirty="0"/>
-                        <a:t>Keine Scala Kenntnisse notwendig (Doku erklärt notwendiges)</a:t>
+                        <a:rPr lang="de-DE" sz="1600" dirty="0"/>
+                        <a:t>Keine Scala Kenntnisse notwendig</a:t>
                       </a:r>
                     </a:p>
                   </a:txBody>
@@ -5127,34 +5259,8 @@
                         <a:buChar char="•"/>
                       </a:pPr>
                       <a:r>
-                        <a:rPr lang="de-DE" dirty="0"/>
+                        <a:rPr lang="de-DE" sz="1600" dirty="0"/>
                         <a:t>Python Kenntnisse (Bsp. CSV-Feeder)</a:t>
-                      </a:r>
-                    </a:p>
-                    <a:p>
-                      <a:pPr marL="285750" indent="-285750">
-                        <a:buFont typeface="Arial" panose="020B0604020202020204" pitchFamily="34" charset="0"/>
-                        <a:buChar char="•"/>
-                      </a:pPr>
-                      <a:r>
-                        <a:rPr lang="de-DE" dirty="0"/>
-                        <a:t>Lokal umständlicher (</a:t>
-                      </a:r>
-                      <a:r>
-                        <a:rPr lang="de-DE" dirty="0" err="1"/>
-                        <a:t>WebUI</a:t>
-                      </a:r>
-                      <a:r>
-                        <a:rPr lang="de-DE" dirty="0"/>
-                        <a:t> zur User </a:t>
-                      </a:r>
-                      <a:r>
-                        <a:rPr lang="de-DE" dirty="0" err="1"/>
-                        <a:t>Config</a:t>
-                      </a:r>
-                      <a:r>
-                        <a:rPr lang="de-DE" dirty="0"/>
-                        <a:t>)</a:t>
                       </a:r>
                     </a:p>
                   </a:txBody>
@@ -5170,15 +5276,15 @@
                         <a:buChar char="•"/>
                       </a:pPr>
                       <a:r>
-                        <a:rPr lang="de-DE" dirty="0"/>
+                        <a:rPr lang="de-DE" sz="1600" dirty="0"/>
                         <a:t>Sprechendes Format (.</a:t>
                       </a:r>
                       <a:r>
-                        <a:rPr lang="de-DE" dirty="0" err="1"/>
+                        <a:rPr lang="de-DE" sz="1600" dirty="0" err="1"/>
                         <a:t>yml</a:t>
                       </a:r>
                       <a:r>
-                        <a:rPr lang="de-DE" dirty="0"/>
+                        <a:rPr lang="de-DE" sz="1600" dirty="0"/>
                         <a:t>)</a:t>
                       </a:r>
                     </a:p>
@@ -5198,8 +5304,8 @@
                     <a:lstStyle/>
                     <a:p>
                       <a:r>
-                        <a:rPr lang="de-DE" dirty="0"/>
-                        <a:t>Einschränkungen beim Umsetzen des Tests</a:t>
+                        <a:rPr lang="de-DE" sz="1600" dirty="0"/>
+                        <a:t>Erkenntnisse beim Umsetzen des Showcases</a:t>
                       </a:r>
                     </a:p>
                   </a:txBody>
@@ -5210,8 +5316,12 @@
                     <a:bodyPr/>
                     <a:lstStyle/>
                     <a:p>
+                      <a:pPr marL="285750" indent="-285750">
+                        <a:buFont typeface="Arial" panose="020B0604020202020204" pitchFamily="34" charset="0"/>
+                        <a:buChar char="•"/>
+                      </a:pPr>
                       <a:r>
-                        <a:rPr lang="de-DE" dirty="0"/>
+                        <a:rPr lang="de-DE" sz="1600" dirty="0"/>
                         <a:t>-</a:t>
                       </a:r>
                     </a:p>
@@ -5228,8 +5338,34 @@
                         <a:buChar char="•"/>
                       </a:pPr>
                       <a:r>
-                        <a:rPr lang="de-DE" dirty="0"/>
+                        <a:rPr lang="de-DE" sz="1600" dirty="0"/>
                         <a:t>Kein CSV-Feeder -&gt; manuelles Schreiben einer passenden Methode</a:t>
+                      </a:r>
+                    </a:p>
+                    <a:p>
+                      <a:pPr marL="285750" indent="-285750">
+                        <a:buFont typeface="Arial" panose="020B0604020202020204" pitchFamily="34" charset="0"/>
+                        <a:buChar char="•"/>
+                      </a:pPr>
+                      <a:r>
+                        <a:rPr lang="de-DE" sz="1600" dirty="0"/>
+                        <a:t>Konfiguration von max. </a:t>
+                      </a:r>
+                      <a:r>
+                        <a:rPr lang="de-DE" sz="1600" dirty="0" err="1"/>
+                        <a:t>Userzahl</a:t>
+                      </a:r>
+                      <a:r>
+                        <a:rPr lang="de-DE" sz="1600" dirty="0"/>
+                        <a:t> + </a:t>
+                      </a:r>
+                      <a:r>
+                        <a:rPr lang="de-DE" sz="1600" dirty="0" err="1"/>
+                        <a:t>Hatchrate</a:t>
+                      </a:r>
+                      <a:r>
+                        <a:rPr lang="de-DE" sz="1600" dirty="0"/>
+                        <a:t> (keine zeitliche Änderung möglich)</a:t>
                       </a:r>
                     </a:p>
                   </a:txBody>
@@ -5245,13 +5381,22 @@
                         <a:buChar char="•"/>
                       </a:pPr>
                       <a:r>
-                        <a:rPr lang="de-DE" dirty="0" err="1"/>
+                        <a:rPr lang="de-DE" sz="1600" dirty="0" err="1"/>
                         <a:t>Ramp</a:t>
                       </a:r>
                       <a:r>
-                        <a:rPr lang="de-DE" dirty="0"/>
-                        <a:t>-Up nicht direkt integriert</a:t>
+                        <a:rPr lang="de-DE" sz="1600" dirty="0"/>
+                        <a:t>-Up nicht direkt integriert (</a:t>
                       </a:r>
+                      <a:r>
+                        <a:rPr lang="de-DE" sz="1600" dirty="0" err="1"/>
+                        <a:t>Phases</a:t>
+                      </a:r>
+                      <a:r>
+                        <a:rPr lang="de-DE" sz="1600"/>
+                        <a:t>)</a:t>
+                      </a:r>
+                      <a:endParaRPr lang="de-DE" sz="1600" dirty="0"/>
                     </a:p>
                   </a:txBody>
                   <a:tcPr/>
@@ -5355,6 +5500,208 @@
       </p:grpSpPr>
       <p:sp>
         <p:nvSpPr>
+          <p:cNvPr id="2" name="Titel 1">
+            <a:extLst>
+              <a:ext uri="{FF2B5EF4-FFF2-40B4-BE49-F238E27FC236}">
+                <a16:creationId xmlns:a16="http://schemas.microsoft.com/office/drawing/2014/main" id="{69A9EDF1-E7ED-4747-8FA0-27EA3B305327}"/>
+              </a:ext>
+            </a:extLst>
+          </p:cNvPr>
+          <p:cNvSpPr>
+            <a:spLocks noGrp="1"/>
+          </p:cNvSpPr>
+          <p:nvPr>
+            <p:ph type="title"/>
+          </p:nvPr>
+        </p:nvSpPr>
+        <p:spPr/>
+        <p:txBody>
+          <a:bodyPr/>
+          <a:lstStyle/>
+          <a:p>
+            <a:r>
+              <a:rPr lang="de-DE" dirty="0"/>
+              <a:t>Code zur Live Demo</a:t>
+            </a:r>
+          </a:p>
+        </p:txBody>
+      </p:sp>
+      <p:sp>
+        <p:nvSpPr>
+          <p:cNvPr id="3" name="Inhaltsplatzhalter 2">
+            <a:extLst>
+              <a:ext uri="{FF2B5EF4-FFF2-40B4-BE49-F238E27FC236}">
+                <a16:creationId xmlns:a16="http://schemas.microsoft.com/office/drawing/2014/main" id="{7C84BEAB-DE12-41ED-8A60-29CA84106732}"/>
+              </a:ext>
+            </a:extLst>
+          </p:cNvPr>
+          <p:cNvSpPr>
+            <a:spLocks noGrp="1"/>
+          </p:cNvSpPr>
+          <p:nvPr>
+            <p:ph idx="1"/>
+          </p:nvPr>
+        </p:nvSpPr>
+        <p:spPr/>
+        <p:txBody>
+          <a:bodyPr/>
+          <a:lstStyle/>
+          <a:p>
+            <a:pPr>
+              <a:buFont typeface="Wingdings" panose="05000000000000000000" pitchFamily="2" charset="2"/>
+              <a:buChar char="Ø"/>
+            </a:pPr>
+            <a:r>
+              <a:rPr lang="de-DE" dirty="0"/>
+              <a:t> Webservice:</a:t>
+            </a:r>
+          </a:p>
+          <a:p>
+            <a:pPr lvl="1">
+              <a:buFont typeface="Wingdings" panose="05000000000000000000" pitchFamily="2" charset="2"/>
+              <a:buChar char="Ø"/>
+            </a:pPr>
+            <a:r>
+              <a:rPr lang="de-DE" dirty="0"/>
+              <a:t> </a:t>
+            </a:r>
+            <a:r>
+              <a:rPr lang="de-DE" dirty="0">
+                <a:hlinkClick r:id="rId2"/>
+              </a:rPr>
+              <a:t>https://github.com/StTraeger/sqs-car-webservice</a:t>
+            </a:r>
+            <a:endParaRPr lang="de-DE" dirty="0"/>
+          </a:p>
+          <a:p>
+            <a:pPr>
+              <a:buFont typeface="Wingdings" panose="05000000000000000000" pitchFamily="2" charset="2"/>
+              <a:buChar char="Ø"/>
+            </a:pPr>
+            <a:r>
+              <a:rPr lang="de-DE" dirty="0"/>
+              <a:t> Projekt mit </a:t>
+            </a:r>
+            <a:r>
+              <a:rPr lang="de-DE" dirty="0" err="1"/>
+              <a:t>Lasttest</a:t>
+            </a:r>
+            <a:r>
+              <a:rPr lang="de-DE" dirty="0"/>
+              <a:t> Implementierungen:</a:t>
+            </a:r>
+          </a:p>
+          <a:p>
+            <a:pPr lvl="1">
+              <a:buFont typeface="Wingdings" panose="05000000000000000000" pitchFamily="2" charset="2"/>
+              <a:buChar char="Ø"/>
+            </a:pPr>
+            <a:r>
+              <a:rPr lang="de-DE" dirty="0">
+                <a:hlinkClick r:id="rId3"/>
+              </a:rPr>
+              <a:t>https://github.com/StTraeger/sqs-load-testing</a:t>
+            </a:r>
+            <a:endParaRPr lang="de-DE" dirty="0"/>
+          </a:p>
+          <a:p>
+            <a:pPr lvl="1">
+              <a:buFont typeface="Wingdings" panose="05000000000000000000" pitchFamily="2" charset="2"/>
+              <a:buChar char="Ø"/>
+            </a:pPr>
+            <a:endParaRPr lang="de-DE" dirty="0"/>
+          </a:p>
+        </p:txBody>
+      </p:sp>
+      <p:sp>
+        <p:nvSpPr>
+          <p:cNvPr id="4" name="Datumsplatzhalter 3">
+            <a:extLst>
+              <a:ext uri="{FF2B5EF4-FFF2-40B4-BE49-F238E27FC236}">
+                <a16:creationId xmlns:a16="http://schemas.microsoft.com/office/drawing/2014/main" id="{E32D3C64-F536-4ABB-AF83-B77C7F660B8A}"/>
+              </a:ext>
+            </a:extLst>
+          </p:cNvPr>
+          <p:cNvSpPr>
+            <a:spLocks noGrp="1"/>
+          </p:cNvSpPr>
+          <p:nvPr>
+            <p:ph type="dt" sz="half" idx="10"/>
+          </p:nvPr>
+        </p:nvSpPr>
+        <p:spPr/>
+        <p:txBody>
+          <a:bodyPr/>
+          <a:lstStyle/>
+          <a:p>
+            <a:r>
+              <a:rPr lang="de-DE"/>
+              <a:t>02.07.2018</a:t>
+            </a:r>
+          </a:p>
+        </p:txBody>
+      </p:sp>
+      <p:sp>
+        <p:nvSpPr>
+          <p:cNvPr id="5" name="Foliennummernplatzhalter 4">
+            <a:extLst>
+              <a:ext uri="{FF2B5EF4-FFF2-40B4-BE49-F238E27FC236}">
+                <a16:creationId xmlns:a16="http://schemas.microsoft.com/office/drawing/2014/main" id="{7B12B4DE-4EF3-4C8E-B51C-8AD90B4A6DD0}"/>
+              </a:ext>
+            </a:extLst>
+          </p:cNvPr>
+          <p:cNvSpPr>
+            <a:spLocks noGrp="1"/>
+          </p:cNvSpPr>
+          <p:nvPr>
+            <p:ph type="sldNum" sz="quarter" idx="12"/>
+          </p:nvPr>
+        </p:nvSpPr>
+        <p:spPr/>
+        <p:txBody>
+          <a:bodyPr/>
+          <a:lstStyle/>
+          <a:p>
+            <a:fld id="{C9BFD74B-BF5B-4F1B-BDFB-3F89FD2A71A6}" type="slidenum">
+              <a:rPr lang="de-DE" smtClean="0"/>
+              <a:t>11</a:t>
+            </a:fld>
+            <a:endParaRPr lang="de-DE"/>
+          </a:p>
+        </p:txBody>
+      </p:sp>
+    </p:spTree>
+    <p:extLst>
+      <p:ext uri="{BB962C8B-B14F-4D97-AF65-F5344CB8AC3E}">
+        <p14:creationId xmlns:p14="http://schemas.microsoft.com/office/powerpoint/2010/main" val="779626361"/>
+      </p:ext>
+    </p:extLst>
+  </p:cSld>
+  <p:clrMapOvr>
+    <a:masterClrMapping/>
+  </p:clrMapOvr>
+</p:sld>
+</file>
+
+<file path=ppt/slides/slide12.xml><?xml version="1.0" encoding="utf-8"?>
+<p:sld xmlns:a="http://schemas.openxmlformats.org/drawingml/2006/main" xmlns:r="http://schemas.openxmlformats.org/officeDocument/2006/relationships" xmlns:p="http://schemas.openxmlformats.org/presentationml/2006/main">
+  <p:cSld>
+    <p:spTree>
+      <p:nvGrpSpPr>
+        <p:cNvPr id="1" name=""/>
+        <p:cNvGrpSpPr/>
+        <p:nvPr/>
+      </p:nvGrpSpPr>
+      <p:grpSpPr>
+        <a:xfrm>
+          <a:off x="0" y="0"/>
+          <a:ext cx="0" cy="0"/>
+          <a:chOff x="0" y="0"/>
+          <a:chExt cx="0" cy="0"/>
+        </a:xfrm>
+      </p:grpSpPr>
+      <p:sp>
+        <p:nvSpPr>
           <p:cNvPr id="2" name="Titel 1"/>
           <p:cNvSpPr>
             <a:spLocks noGrp="1"/>
@@ -5419,7 +5766,7 @@
           <a:p>
             <a:fld id="{C9BFD74B-BF5B-4F1B-BDFB-3F89FD2A71A6}" type="slidenum">
               <a:rPr lang="de-DE" smtClean="0"/>
-              <a:t>11</a:t>
+              <a:t>12</a:t>
             </a:fld>
             <a:endParaRPr lang="de-DE"/>
           </a:p>

</xml_diff>